<commit_message>
0/1 knapsack slides done
</commit_message>
<xml_diff>
--- a/DYNAMIC PROGRAMMING.pptx
+++ b/DYNAMIC PROGRAMMING.pptx
@@ -9,6 +9,15 @@
     <p:sldId id="257" r:id="rId3"/>
     <p:sldId id="258" r:id="rId4"/>
     <p:sldId id="259" r:id="rId5"/>
+    <p:sldId id="263" r:id="rId6"/>
+    <p:sldId id="260" r:id="rId7"/>
+    <p:sldId id="261" r:id="rId8"/>
+    <p:sldId id="262" r:id="rId9"/>
+    <p:sldId id="264" r:id="rId10"/>
+    <p:sldId id="265" r:id="rId11"/>
+    <p:sldId id="267" r:id="rId12"/>
+    <p:sldId id="266" r:id="rId13"/>
+    <p:sldId id="268" r:id="rId14"/>
   </p:sldIdLst>
   <p:sldSz cx="12192000" cy="6858000"/>
   <p:notesSz cx="6858000" cy="9144000"/>
@@ -832,7 +841,7 @@
           <a:p>
             <a:fld id="{1C3BBAFD-D51C-4A61-A645-41B7EAC882DB}" type="datetimeFigureOut">
               <a:rPr lang="en-IN" smtClean="0"/>
-              <a:t>24-03-2023</a:t>
+              <a:t>26-03-2023</a:t>
             </a:fld>
             <a:endParaRPr lang="en-IN"/>
           </a:p>
@@ -1083,7 +1092,7 @@
           <a:p>
             <a:fld id="{1C3BBAFD-D51C-4A61-A645-41B7EAC882DB}" type="datetimeFigureOut">
               <a:rPr lang="en-IN" smtClean="0"/>
-              <a:t>24-03-2023</a:t>
+              <a:t>26-03-2023</a:t>
             </a:fld>
             <a:endParaRPr lang="en-IN"/>
           </a:p>
@@ -1397,7 +1406,7 @@
           <a:p>
             <a:fld id="{1C3BBAFD-D51C-4A61-A645-41B7EAC882DB}" type="datetimeFigureOut">
               <a:rPr lang="en-IN" smtClean="0"/>
-              <a:t>24-03-2023</a:t>
+              <a:t>26-03-2023</a:t>
             </a:fld>
             <a:endParaRPr lang="en-IN"/>
           </a:p>
@@ -1738,7 +1747,7 @@
           <a:p>
             <a:fld id="{1C3BBAFD-D51C-4A61-A645-41B7EAC882DB}" type="datetimeFigureOut">
               <a:rPr lang="en-IN" smtClean="0"/>
-              <a:t>24-03-2023</a:t>
+              <a:t>26-03-2023</a:t>
             </a:fld>
             <a:endParaRPr lang="en-IN"/>
           </a:p>
@@ -2052,7 +2061,7 @@
           <a:p>
             <a:fld id="{1C3BBAFD-D51C-4A61-A645-41B7EAC882DB}" type="datetimeFigureOut">
               <a:rPr lang="en-IN" smtClean="0"/>
-              <a:t>24-03-2023</a:t>
+              <a:t>26-03-2023</a:t>
             </a:fld>
             <a:endParaRPr lang="en-IN"/>
           </a:p>
@@ -2445,7 +2454,7 @@
           <a:p>
             <a:fld id="{1C3BBAFD-D51C-4A61-A645-41B7EAC882DB}" type="datetimeFigureOut">
               <a:rPr lang="en-IN" smtClean="0"/>
-              <a:t>24-03-2023</a:t>
+              <a:t>26-03-2023</a:t>
             </a:fld>
             <a:endParaRPr lang="en-IN"/>
           </a:p>
@@ -2615,7 +2624,7 @@
           <a:p>
             <a:fld id="{1C3BBAFD-D51C-4A61-A645-41B7EAC882DB}" type="datetimeFigureOut">
               <a:rPr lang="en-IN" smtClean="0"/>
-              <a:t>24-03-2023</a:t>
+              <a:t>26-03-2023</a:t>
             </a:fld>
             <a:endParaRPr lang="en-IN"/>
           </a:p>
@@ -2795,7 +2804,7 @@
           <a:p>
             <a:fld id="{1C3BBAFD-D51C-4A61-A645-41B7EAC882DB}" type="datetimeFigureOut">
               <a:rPr lang="en-IN" smtClean="0"/>
-              <a:t>24-03-2023</a:t>
+              <a:t>26-03-2023</a:t>
             </a:fld>
             <a:endParaRPr lang="en-IN"/>
           </a:p>
@@ -2971,7 +2980,7 @@
           <a:p>
             <a:fld id="{1C3BBAFD-D51C-4A61-A645-41B7EAC882DB}" type="datetimeFigureOut">
               <a:rPr lang="en-IN" smtClean="0"/>
-              <a:t>24-03-2023</a:t>
+              <a:t>26-03-2023</a:t>
             </a:fld>
             <a:endParaRPr lang="en-IN"/>
           </a:p>
@@ -3218,7 +3227,7 @@
           <a:p>
             <a:fld id="{1C3BBAFD-D51C-4A61-A645-41B7EAC882DB}" type="datetimeFigureOut">
               <a:rPr lang="en-IN" smtClean="0"/>
-              <a:t>24-03-2023</a:t>
+              <a:t>26-03-2023</a:t>
             </a:fld>
             <a:endParaRPr lang="en-IN"/>
           </a:p>
@@ -3450,7 +3459,7 @@
           <a:p>
             <a:fld id="{1C3BBAFD-D51C-4A61-A645-41B7EAC882DB}" type="datetimeFigureOut">
               <a:rPr lang="en-IN" smtClean="0"/>
-              <a:t>24-03-2023</a:t>
+              <a:t>26-03-2023</a:t>
             </a:fld>
             <a:endParaRPr lang="en-IN"/>
           </a:p>
@@ -3824,7 +3833,7 @@
           <a:p>
             <a:fld id="{1C3BBAFD-D51C-4A61-A645-41B7EAC882DB}" type="datetimeFigureOut">
               <a:rPr lang="en-IN" smtClean="0"/>
-              <a:t>24-03-2023</a:t>
+              <a:t>26-03-2023</a:t>
             </a:fld>
             <a:endParaRPr lang="en-IN"/>
           </a:p>
@@ -3947,7 +3956,7 @@
           <a:p>
             <a:fld id="{1C3BBAFD-D51C-4A61-A645-41B7EAC882DB}" type="datetimeFigureOut">
               <a:rPr lang="en-IN" smtClean="0"/>
-              <a:t>24-03-2023</a:t>
+              <a:t>26-03-2023</a:t>
             </a:fld>
             <a:endParaRPr lang="en-IN"/>
           </a:p>
@@ -4042,7 +4051,7 @@
           <a:p>
             <a:fld id="{1C3BBAFD-D51C-4A61-A645-41B7EAC882DB}" type="datetimeFigureOut">
               <a:rPr lang="en-IN" smtClean="0"/>
-              <a:t>24-03-2023</a:t>
+              <a:t>26-03-2023</a:t>
             </a:fld>
             <a:endParaRPr lang="en-IN"/>
           </a:p>
@@ -4297,7 +4306,7 @@
           <a:p>
             <a:fld id="{1C3BBAFD-D51C-4A61-A645-41B7EAC882DB}" type="datetimeFigureOut">
               <a:rPr lang="en-IN" smtClean="0"/>
-              <a:t>24-03-2023</a:t>
+              <a:t>26-03-2023</a:t>
             </a:fld>
             <a:endParaRPr lang="en-IN"/>
           </a:p>
@@ -4560,7 +4569,7 @@
           <a:p>
             <a:fld id="{1C3BBAFD-D51C-4A61-A645-41B7EAC882DB}" type="datetimeFigureOut">
               <a:rPr lang="en-IN" smtClean="0"/>
-              <a:t>24-03-2023</a:t>
+              <a:t>26-03-2023</a:t>
             </a:fld>
             <a:endParaRPr lang="en-IN"/>
           </a:p>
@@ -5303,7 +5312,7 @@
           <a:p>
             <a:fld id="{1C3BBAFD-D51C-4A61-A645-41B7EAC882DB}" type="datetimeFigureOut">
               <a:rPr lang="en-IN" smtClean="0"/>
-              <a:t>24-03-2023</a:t>
+              <a:t>26-03-2023</a:t>
             </a:fld>
             <a:endParaRPr lang="en-IN"/>
           </a:p>
@@ -5832,7 +5841,7 @@
           <p:cNvPr id="2" name="Title 1">
             <a:extLst>
               <a:ext uri="{FF2B5EF4-FFF2-40B4-BE49-F238E27FC236}">
-                <a16:creationId xmlns:a16="http://schemas.microsoft.com/office/drawing/2014/main" id="{7B9BDE16-FD4E-7618-B221-6009020723A8}"/>
+                <a16:creationId xmlns="" xmlns:a16="http://schemas.microsoft.com/office/drawing/2014/main" id="{7B9BDE16-FD4E-7618-B221-6009020723A8}"/>
               </a:ext>
             </a:extLst>
           </p:cNvPr>
@@ -5860,7 +5869,7 @@
           <p:cNvPr id="3" name="Subtitle 2">
             <a:extLst>
               <a:ext uri="{FF2B5EF4-FFF2-40B4-BE49-F238E27FC236}">
-                <a16:creationId xmlns:a16="http://schemas.microsoft.com/office/drawing/2014/main" id="{771C1FC4-D77F-0CF6-1282-3F5E43B016C2}"/>
+                <a16:creationId xmlns="" xmlns:a16="http://schemas.microsoft.com/office/drawing/2014/main" id="{771C1FC4-D77F-0CF6-1282-3F5E43B016C2}"/>
               </a:ext>
             </a:extLst>
           </p:cNvPr>
@@ -5884,6 +5893,957 @@
     <p:extLst>
       <p:ext uri="{BB962C8B-B14F-4D97-AF65-F5344CB8AC3E}">
         <p14:creationId xmlns:p14="http://schemas.microsoft.com/office/powerpoint/2010/main" val="2622480725"/>
+      </p:ext>
+    </p:extLst>
+  </p:cSld>
+  <p:clrMapOvr>
+    <a:masterClrMapping/>
+  </p:clrMapOvr>
+</p:sld>
+</file>
+
+<file path=ppt/slides/slide10.xml><?xml version="1.0" encoding="utf-8"?>
+<p:sld xmlns:a="http://schemas.openxmlformats.org/drawingml/2006/main" xmlns:r="http://schemas.openxmlformats.org/officeDocument/2006/relationships" xmlns:p="http://schemas.openxmlformats.org/presentationml/2006/main">
+  <p:cSld>
+    <p:spTree>
+      <p:nvGrpSpPr>
+        <p:cNvPr id="1" name=""/>
+        <p:cNvGrpSpPr/>
+        <p:nvPr/>
+      </p:nvGrpSpPr>
+      <p:grpSpPr>
+        <a:xfrm>
+          <a:off x="0" y="0"/>
+          <a:ext cx="0" cy="0"/>
+          <a:chOff x="0" y="0"/>
+          <a:chExt cx="0" cy="0"/>
+        </a:xfrm>
+      </p:grpSpPr>
+      <p:sp>
+        <p:nvSpPr>
+          <p:cNvPr id="2" name="Title 1"/>
+          <p:cNvSpPr>
+            <a:spLocks noGrp="1"/>
+          </p:cNvSpPr>
+          <p:nvPr>
+            <p:ph type="title"/>
+          </p:nvPr>
+        </p:nvSpPr>
+        <p:spPr/>
+        <p:txBody>
+          <a:bodyPr>
+            <a:noAutofit/>
+          </a:bodyPr>
+          <a:lstStyle/>
+          <a:p>
+            <a:r>
+              <a:rPr lang="en-US" sz="4800" dirty="0" smtClean="0"/>
+              <a:t>Space Optimization</a:t>
+            </a:r>
+            <a:br>
+              <a:rPr lang="en-US" sz="4800" dirty="0" smtClean="0"/>
+            </a:br>
+            <a:r>
+              <a:rPr lang="en-US" sz="4800" dirty="0" smtClean="0"/>
+              <a:t>Using only 2 Rows</a:t>
+            </a:r>
+            <a:endParaRPr lang="en-US" sz="4800" dirty="0"/>
+          </a:p>
+        </p:txBody>
+      </p:sp>
+      <p:graphicFrame>
+        <p:nvGraphicFramePr>
+          <p:cNvPr id="3" name="Table 2"/>
+          <p:cNvGraphicFramePr>
+            <a:graphicFrameLocks noGrp="1"/>
+          </p:cNvGraphicFramePr>
+          <p:nvPr>
+            <p:extLst>
+              <p:ext uri="{D42A27DB-BD31-4B8C-83A1-F6EECF244321}">
+                <p14:modId xmlns:p14="http://schemas.microsoft.com/office/powerpoint/2010/main" val="1744403093"/>
+              </p:ext>
+            </p:extLst>
+          </p:nvPr>
+        </p:nvGraphicFramePr>
+        <p:xfrm>
+          <a:off x="1156237" y="3411350"/>
+          <a:ext cx="8128000" cy="1112520"/>
+        </p:xfrm>
+        <a:graphic>
+          <a:graphicData uri="http://schemas.openxmlformats.org/drawingml/2006/table">
+            <a:tbl>
+              <a:tblPr firstRow="1" bandRow="1">
+                <a:tableStyleId>{5C22544A-7EE6-4342-B048-85BDC9FD1C3A}</a:tableStyleId>
+              </a:tblPr>
+              <a:tblGrid>
+                <a:gridCol w="1016000"/>
+                <a:gridCol w="1016000"/>
+                <a:gridCol w="1016000"/>
+                <a:gridCol w="1016000"/>
+                <a:gridCol w="1016000"/>
+                <a:gridCol w="1016000"/>
+                <a:gridCol w="1016000"/>
+                <a:gridCol w="1016000"/>
+              </a:tblGrid>
+              <a:tr h="370840">
+                <a:tc>
+                  <a:txBody>
+                    <a:bodyPr/>
+                    <a:lstStyle/>
+                    <a:p>
+                      <a:endParaRPr lang="en-US" dirty="0"/>
+                    </a:p>
+                  </a:txBody>
+                  <a:tcPr/>
+                </a:tc>
+                <a:tc>
+                  <a:txBody>
+                    <a:bodyPr/>
+                    <a:lstStyle/>
+                    <a:p>
+                      <a:r>
+                        <a:rPr lang="en-US" dirty="0" smtClean="0"/>
+                        <a:t>0</a:t>
+                      </a:r>
+                    </a:p>
+                  </a:txBody>
+                  <a:tcPr/>
+                </a:tc>
+                <a:tc>
+                  <a:txBody>
+                    <a:bodyPr/>
+                    <a:lstStyle/>
+                    <a:p>
+                      <a:r>
+                        <a:rPr lang="en-US" dirty="0" smtClean="0"/>
+                        <a:t>1</a:t>
+                      </a:r>
+                      <a:endParaRPr lang="en-US" dirty="0"/>
+                    </a:p>
+                  </a:txBody>
+                  <a:tcPr/>
+                </a:tc>
+                <a:tc>
+                  <a:txBody>
+                    <a:bodyPr/>
+                    <a:lstStyle/>
+                    <a:p>
+                      <a:r>
+                        <a:rPr lang="en-US" dirty="0" smtClean="0"/>
+                        <a:t>2</a:t>
+                      </a:r>
+                      <a:endParaRPr lang="en-US" dirty="0"/>
+                    </a:p>
+                  </a:txBody>
+                  <a:tcPr/>
+                </a:tc>
+                <a:tc>
+                  <a:txBody>
+                    <a:bodyPr/>
+                    <a:lstStyle/>
+                    <a:p>
+                      <a:r>
+                        <a:rPr lang="en-US" dirty="0" smtClean="0"/>
+                        <a:t>3</a:t>
+                      </a:r>
+                      <a:endParaRPr lang="en-US" dirty="0"/>
+                    </a:p>
+                  </a:txBody>
+                  <a:tcPr/>
+                </a:tc>
+                <a:tc>
+                  <a:txBody>
+                    <a:bodyPr/>
+                    <a:lstStyle/>
+                    <a:p>
+                      <a:r>
+                        <a:rPr lang="en-US" dirty="0" smtClean="0"/>
+                        <a:t>4</a:t>
+                      </a:r>
+                      <a:endParaRPr lang="en-US" dirty="0"/>
+                    </a:p>
+                  </a:txBody>
+                  <a:tcPr/>
+                </a:tc>
+                <a:tc>
+                  <a:txBody>
+                    <a:bodyPr/>
+                    <a:lstStyle/>
+                    <a:p>
+                      <a:r>
+                        <a:rPr lang="en-US" dirty="0" smtClean="0"/>
+                        <a:t>5</a:t>
+                      </a:r>
+                      <a:endParaRPr lang="en-US" dirty="0"/>
+                    </a:p>
+                  </a:txBody>
+                  <a:tcPr/>
+                </a:tc>
+                <a:tc>
+                  <a:txBody>
+                    <a:bodyPr/>
+                    <a:lstStyle/>
+                    <a:p>
+                      <a:r>
+                        <a:rPr lang="en-US" dirty="0" smtClean="0"/>
+                        <a:t>6</a:t>
+                      </a:r>
+                      <a:endParaRPr lang="en-US" dirty="0"/>
+                    </a:p>
+                  </a:txBody>
+                  <a:tcPr/>
+                </a:tc>
+              </a:tr>
+              <a:tr h="370840">
+                <a:tc>
+                  <a:txBody>
+                    <a:bodyPr/>
+                    <a:lstStyle/>
+                    <a:p>
+                      <a:r>
+                        <a:rPr lang="en-US" dirty="0" smtClean="0"/>
+                        <a:t>0</a:t>
+                      </a:r>
+                      <a:endParaRPr lang="en-US" dirty="0"/>
+                    </a:p>
+                  </a:txBody>
+                  <a:tcPr/>
+                </a:tc>
+                <a:tc>
+                  <a:txBody>
+                    <a:bodyPr/>
+                    <a:lstStyle/>
+                    <a:p>
+                      <a:endParaRPr lang="en-US" dirty="0"/>
+                    </a:p>
+                  </a:txBody>
+                  <a:tcPr/>
+                </a:tc>
+                <a:tc>
+                  <a:txBody>
+                    <a:bodyPr/>
+                    <a:lstStyle/>
+                    <a:p>
+                      <a:endParaRPr lang="en-US"/>
+                    </a:p>
+                  </a:txBody>
+                  <a:tcPr/>
+                </a:tc>
+                <a:tc>
+                  <a:txBody>
+                    <a:bodyPr/>
+                    <a:lstStyle/>
+                    <a:p>
+                      <a:endParaRPr lang="en-US"/>
+                    </a:p>
+                  </a:txBody>
+                  <a:tcPr/>
+                </a:tc>
+                <a:tc>
+                  <a:txBody>
+                    <a:bodyPr/>
+                    <a:lstStyle/>
+                    <a:p>
+                      <a:endParaRPr lang="en-US"/>
+                    </a:p>
+                  </a:txBody>
+                  <a:tcPr/>
+                </a:tc>
+                <a:tc>
+                  <a:txBody>
+                    <a:bodyPr/>
+                    <a:lstStyle/>
+                    <a:p>
+                      <a:endParaRPr lang="en-US"/>
+                    </a:p>
+                  </a:txBody>
+                  <a:tcPr/>
+                </a:tc>
+                <a:tc>
+                  <a:txBody>
+                    <a:bodyPr/>
+                    <a:lstStyle/>
+                    <a:p>
+                      <a:endParaRPr lang="en-US"/>
+                    </a:p>
+                  </a:txBody>
+                  <a:tcPr/>
+                </a:tc>
+                <a:tc>
+                  <a:txBody>
+                    <a:bodyPr/>
+                    <a:lstStyle/>
+                    <a:p>
+                      <a:endParaRPr lang="en-US"/>
+                    </a:p>
+                  </a:txBody>
+                  <a:tcPr/>
+                </a:tc>
+              </a:tr>
+              <a:tr h="370840">
+                <a:tc>
+                  <a:txBody>
+                    <a:bodyPr/>
+                    <a:lstStyle/>
+                    <a:p>
+                      <a:r>
+                        <a:rPr lang="en-US" dirty="0" smtClean="0"/>
+                        <a:t>1</a:t>
+                      </a:r>
+                      <a:endParaRPr lang="en-US" dirty="0"/>
+                    </a:p>
+                  </a:txBody>
+                  <a:tcPr/>
+                </a:tc>
+                <a:tc>
+                  <a:txBody>
+                    <a:bodyPr/>
+                    <a:lstStyle/>
+                    <a:p>
+                      <a:endParaRPr lang="en-US" dirty="0"/>
+                    </a:p>
+                  </a:txBody>
+                  <a:tcPr/>
+                </a:tc>
+                <a:tc>
+                  <a:txBody>
+                    <a:bodyPr/>
+                    <a:lstStyle/>
+                    <a:p>
+                      <a:endParaRPr lang="en-US"/>
+                    </a:p>
+                  </a:txBody>
+                  <a:tcPr/>
+                </a:tc>
+                <a:tc>
+                  <a:txBody>
+                    <a:bodyPr/>
+                    <a:lstStyle/>
+                    <a:p>
+                      <a:endParaRPr lang="en-US"/>
+                    </a:p>
+                  </a:txBody>
+                  <a:tcPr/>
+                </a:tc>
+                <a:tc>
+                  <a:txBody>
+                    <a:bodyPr/>
+                    <a:lstStyle/>
+                    <a:p>
+                      <a:endParaRPr lang="en-US"/>
+                    </a:p>
+                  </a:txBody>
+                  <a:tcPr/>
+                </a:tc>
+                <a:tc>
+                  <a:txBody>
+                    <a:bodyPr/>
+                    <a:lstStyle/>
+                    <a:p>
+                      <a:endParaRPr lang="en-US"/>
+                    </a:p>
+                  </a:txBody>
+                  <a:tcPr/>
+                </a:tc>
+                <a:tc>
+                  <a:txBody>
+                    <a:bodyPr/>
+                    <a:lstStyle/>
+                    <a:p>
+                      <a:endParaRPr lang="en-US"/>
+                    </a:p>
+                  </a:txBody>
+                  <a:tcPr/>
+                </a:tc>
+                <a:tc>
+                  <a:txBody>
+                    <a:bodyPr/>
+                    <a:lstStyle/>
+                    <a:p>
+                      <a:endParaRPr lang="en-US" dirty="0"/>
+                    </a:p>
+                  </a:txBody>
+                  <a:tcPr/>
+                </a:tc>
+              </a:tr>
+            </a:tbl>
+          </a:graphicData>
+        </a:graphic>
+      </p:graphicFrame>
+    </p:spTree>
+    <p:extLst>
+      <p:ext uri="{BB962C8B-B14F-4D97-AF65-F5344CB8AC3E}">
+        <p14:creationId xmlns:p14="http://schemas.microsoft.com/office/powerpoint/2010/main" val="1666059744"/>
+      </p:ext>
+    </p:extLst>
+  </p:cSld>
+  <p:clrMapOvr>
+    <a:masterClrMapping/>
+  </p:clrMapOvr>
+</p:sld>
+</file>
+
+<file path=ppt/slides/slide11.xml><?xml version="1.0" encoding="utf-8"?>
+<p:sld xmlns:a="http://schemas.openxmlformats.org/drawingml/2006/main" xmlns:r="http://schemas.openxmlformats.org/officeDocument/2006/relationships" xmlns:p="http://schemas.openxmlformats.org/presentationml/2006/main">
+  <p:cSld>
+    <p:spTree>
+      <p:nvGrpSpPr>
+        <p:cNvPr id="1" name=""/>
+        <p:cNvGrpSpPr/>
+        <p:nvPr/>
+      </p:nvGrpSpPr>
+      <p:grpSpPr>
+        <a:xfrm>
+          <a:off x="0" y="0"/>
+          <a:ext cx="0" cy="0"/>
+          <a:chOff x="0" y="0"/>
+          <a:chExt cx="0" cy="0"/>
+        </a:xfrm>
+      </p:grpSpPr>
+      <p:sp>
+        <p:nvSpPr>
+          <p:cNvPr id="2" name="Title 1"/>
+          <p:cNvSpPr>
+            <a:spLocks noGrp="1"/>
+          </p:cNvSpPr>
+          <p:nvPr>
+            <p:ph type="title"/>
+          </p:nvPr>
+        </p:nvSpPr>
+        <p:spPr/>
+        <p:txBody>
+          <a:bodyPr>
+            <a:normAutofit/>
+          </a:bodyPr>
+          <a:lstStyle/>
+          <a:p>
+            <a:r>
+              <a:rPr lang="en-US" sz="4400" dirty="0" smtClean="0"/>
+              <a:t>Complexities</a:t>
+            </a:r>
+            <a:endParaRPr lang="en-US" sz="4400" dirty="0"/>
+          </a:p>
+        </p:txBody>
+      </p:sp>
+      <p:sp>
+        <p:nvSpPr>
+          <p:cNvPr id="3" name="Rectangle 2"/>
+          <p:cNvSpPr/>
+          <p:nvPr/>
+        </p:nvSpPr>
+        <p:spPr>
+          <a:xfrm>
+            <a:off x="910107" y="2497985"/>
+            <a:ext cx="6096000" cy="954107"/>
+          </a:xfrm>
+          <a:prstGeom prst="rect">
+            <a:avLst/>
+          </a:prstGeom>
+        </p:spPr>
+        <p:txBody>
+          <a:bodyPr>
+            <a:spAutoFit/>
+          </a:bodyPr>
+          <a:lstStyle/>
+          <a:p>
+            <a:r>
+              <a:rPr lang="en-US" sz="2800" b="1" dirty="0"/>
+              <a:t>Time Complexity: </a:t>
+            </a:r>
+            <a:r>
+              <a:rPr lang="en-US" sz="2800" dirty="0" smtClean="0"/>
+              <a:t>O(N*W)</a:t>
+            </a:r>
+            <a:r>
+              <a:rPr lang="en-US" sz="2800" dirty="0"/>
+              <a:t/>
+            </a:r>
+            <a:br>
+              <a:rPr lang="en-US" sz="2800" dirty="0"/>
+            </a:br>
+            <a:r>
+              <a:rPr lang="en-US" sz="2800" b="1" dirty="0"/>
+              <a:t>Auxiliary Space: </a:t>
+            </a:r>
+            <a:r>
+              <a:rPr lang="en-US" sz="2800" dirty="0" smtClean="0"/>
+              <a:t>O(2*W)</a:t>
+            </a:r>
+            <a:endParaRPr lang="en-US" sz="2800" dirty="0"/>
+          </a:p>
+        </p:txBody>
+      </p:sp>
+    </p:spTree>
+    <p:extLst>
+      <p:ext uri="{BB962C8B-B14F-4D97-AF65-F5344CB8AC3E}">
+        <p14:creationId xmlns:p14="http://schemas.microsoft.com/office/powerpoint/2010/main" val="3358961106"/>
+      </p:ext>
+    </p:extLst>
+  </p:cSld>
+  <p:clrMapOvr>
+    <a:masterClrMapping/>
+  </p:clrMapOvr>
+</p:sld>
+</file>
+
+<file path=ppt/slides/slide12.xml><?xml version="1.0" encoding="utf-8"?>
+<p:sld xmlns:a="http://schemas.openxmlformats.org/drawingml/2006/main" xmlns:r="http://schemas.openxmlformats.org/officeDocument/2006/relationships" xmlns:p="http://schemas.openxmlformats.org/presentationml/2006/main">
+  <p:cSld>
+    <p:spTree>
+      <p:nvGrpSpPr>
+        <p:cNvPr id="1" name=""/>
+        <p:cNvGrpSpPr/>
+        <p:nvPr/>
+      </p:nvGrpSpPr>
+      <p:grpSpPr>
+        <a:xfrm>
+          <a:off x="0" y="0"/>
+          <a:ext cx="0" cy="0"/>
+          <a:chOff x="0" y="0"/>
+          <a:chExt cx="0" cy="0"/>
+        </a:xfrm>
+      </p:grpSpPr>
+      <p:sp>
+        <p:nvSpPr>
+          <p:cNvPr id="2" name="Title 1"/>
+          <p:cNvSpPr>
+            <a:spLocks noGrp="1"/>
+          </p:cNvSpPr>
+          <p:nvPr>
+            <p:ph type="title"/>
+          </p:nvPr>
+        </p:nvSpPr>
+        <p:spPr/>
+        <p:txBody>
+          <a:bodyPr>
+            <a:noAutofit/>
+          </a:bodyPr>
+          <a:lstStyle/>
+          <a:p>
+            <a:r>
+              <a:rPr lang="en-US" sz="4800" dirty="0" smtClean="0"/>
+              <a:t>Space Optimization</a:t>
+            </a:r>
+            <a:br>
+              <a:rPr lang="en-US" sz="4800" dirty="0" smtClean="0"/>
+            </a:br>
+            <a:r>
+              <a:rPr lang="en-US" sz="4800" dirty="0" smtClean="0"/>
+              <a:t>Using only 1 Row</a:t>
+            </a:r>
+            <a:endParaRPr lang="en-US" sz="4800" dirty="0"/>
+          </a:p>
+        </p:txBody>
+      </p:sp>
+      <p:graphicFrame>
+        <p:nvGraphicFramePr>
+          <p:cNvPr id="3" name="Table 2"/>
+          <p:cNvGraphicFramePr>
+            <a:graphicFrameLocks noGrp="1"/>
+          </p:cNvGraphicFramePr>
+          <p:nvPr>
+            <p:extLst>
+              <p:ext uri="{D42A27DB-BD31-4B8C-83A1-F6EECF244321}">
+                <p14:modId xmlns:p14="http://schemas.microsoft.com/office/powerpoint/2010/main" val="66697030"/>
+              </p:ext>
+            </p:extLst>
+          </p:nvPr>
+        </p:nvGraphicFramePr>
+        <p:xfrm>
+          <a:off x="1156237" y="3411350"/>
+          <a:ext cx="8128000" cy="741680"/>
+        </p:xfrm>
+        <a:graphic>
+          <a:graphicData uri="http://schemas.openxmlformats.org/drawingml/2006/table">
+            <a:tbl>
+              <a:tblPr firstRow="1" bandRow="1">
+                <a:tableStyleId>{5C22544A-7EE6-4342-B048-85BDC9FD1C3A}</a:tableStyleId>
+              </a:tblPr>
+              <a:tblGrid>
+                <a:gridCol w="1016000"/>
+                <a:gridCol w="1016000"/>
+                <a:gridCol w="1016000"/>
+                <a:gridCol w="1016000"/>
+                <a:gridCol w="1016000"/>
+                <a:gridCol w="1016000"/>
+                <a:gridCol w="1016000"/>
+                <a:gridCol w="1016000"/>
+              </a:tblGrid>
+              <a:tr h="370840">
+                <a:tc>
+                  <a:txBody>
+                    <a:bodyPr/>
+                    <a:lstStyle/>
+                    <a:p>
+                      <a:endParaRPr lang="en-US" dirty="0"/>
+                    </a:p>
+                  </a:txBody>
+                  <a:tcPr/>
+                </a:tc>
+                <a:tc>
+                  <a:txBody>
+                    <a:bodyPr/>
+                    <a:lstStyle/>
+                    <a:p>
+                      <a:r>
+                        <a:rPr lang="en-US" dirty="0" smtClean="0"/>
+                        <a:t>0</a:t>
+                      </a:r>
+                    </a:p>
+                  </a:txBody>
+                  <a:tcPr/>
+                </a:tc>
+                <a:tc>
+                  <a:txBody>
+                    <a:bodyPr/>
+                    <a:lstStyle/>
+                    <a:p>
+                      <a:r>
+                        <a:rPr lang="en-US" dirty="0" smtClean="0"/>
+                        <a:t>1</a:t>
+                      </a:r>
+                      <a:endParaRPr lang="en-US" dirty="0"/>
+                    </a:p>
+                  </a:txBody>
+                  <a:tcPr/>
+                </a:tc>
+                <a:tc>
+                  <a:txBody>
+                    <a:bodyPr/>
+                    <a:lstStyle/>
+                    <a:p>
+                      <a:r>
+                        <a:rPr lang="en-US" dirty="0" smtClean="0"/>
+                        <a:t>2</a:t>
+                      </a:r>
+                      <a:endParaRPr lang="en-US" dirty="0"/>
+                    </a:p>
+                  </a:txBody>
+                  <a:tcPr/>
+                </a:tc>
+                <a:tc>
+                  <a:txBody>
+                    <a:bodyPr/>
+                    <a:lstStyle/>
+                    <a:p>
+                      <a:r>
+                        <a:rPr lang="en-US" dirty="0" smtClean="0"/>
+                        <a:t>3</a:t>
+                      </a:r>
+                      <a:endParaRPr lang="en-US" dirty="0"/>
+                    </a:p>
+                  </a:txBody>
+                  <a:tcPr/>
+                </a:tc>
+                <a:tc>
+                  <a:txBody>
+                    <a:bodyPr/>
+                    <a:lstStyle/>
+                    <a:p>
+                      <a:r>
+                        <a:rPr lang="en-US" dirty="0" smtClean="0"/>
+                        <a:t>4</a:t>
+                      </a:r>
+                      <a:endParaRPr lang="en-US" dirty="0"/>
+                    </a:p>
+                  </a:txBody>
+                  <a:tcPr/>
+                </a:tc>
+                <a:tc>
+                  <a:txBody>
+                    <a:bodyPr/>
+                    <a:lstStyle/>
+                    <a:p>
+                      <a:r>
+                        <a:rPr lang="en-US" dirty="0" smtClean="0"/>
+                        <a:t>5</a:t>
+                      </a:r>
+                      <a:endParaRPr lang="en-US" dirty="0"/>
+                    </a:p>
+                  </a:txBody>
+                  <a:tcPr/>
+                </a:tc>
+                <a:tc>
+                  <a:txBody>
+                    <a:bodyPr/>
+                    <a:lstStyle/>
+                    <a:p>
+                      <a:r>
+                        <a:rPr lang="en-US" dirty="0" smtClean="0"/>
+                        <a:t>6</a:t>
+                      </a:r>
+                      <a:endParaRPr lang="en-US" dirty="0"/>
+                    </a:p>
+                  </a:txBody>
+                  <a:tcPr/>
+                </a:tc>
+              </a:tr>
+              <a:tr h="370840">
+                <a:tc>
+                  <a:txBody>
+                    <a:bodyPr/>
+                    <a:lstStyle/>
+                    <a:p>
+                      <a:r>
+                        <a:rPr lang="en-US" dirty="0" smtClean="0"/>
+                        <a:t>0</a:t>
+                      </a:r>
+                      <a:endParaRPr lang="en-US" dirty="0"/>
+                    </a:p>
+                  </a:txBody>
+                  <a:tcPr/>
+                </a:tc>
+                <a:tc>
+                  <a:txBody>
+                    <a:bodyPr/>
+                    <a:lstStyle/>
+                    <a:p>
+                      <a:endParaRPr lang="en-US" dirty="0"/>
+                    </a:p>
+                  </a:txBody>
+                  <a:tcPr/>
+                </a:tc>
+                <a:tc>
+                  <a:txBody>
+                    <a:bodyPr/>
+                    <a:lstStyle/>
+                    <a:p>
+                      <a:endParaRPr lang="en-US"/>
+                    </a:p>
+                  </a:txBody>
+                  <a:tcPr/>
+                </a:tc>
+                <a:tc>
+                  <a:txBody>
+                    <a:bodyPr/>
+                    <a:lstStyle/>
+                    <a:p>
+                      <a:endParaRPr lang="en-US"/>
+                    </a:p>
+                  </a:txBody>
+                  <a:tcPr/>
+                </a:tc>
+                <a:tc>
+                  <a:txBody>
+                    <a:bodyPr/>
+                    <a:lstStyle/>
+                    <a:p>
+                      <a:endParaRPr lang="en-US"/>
+                    </a:p>
+                  </a:txBody>
+                  <a:tcPr/>
+                </a:tc>
+                <a:tc>
+                  <a:txBody>
+                    <a:bodyPr/>
+                    <a:lstStyle/>
+                    <a:p>
+                      <a:endParaRPr lang="en-US"/>
+                    </a:p>
+                  </a:txBody>
+                  <a:tcPr/>
+                </a:tc>
+                <a:tc>
+                  <a:txBody>
+                    <a:bodyPr/>
+                    <a:lstStyle/>
+                    <a:p>
+                      <a:endParaRPr lang="en-US"/>
+                    </a:p>
+                  </a:txBody>
+                  <a:tcPr/>
+                </a:tc>
+                <a:tc>
+                  <a:txBody>
+                    <a:bodyPr/>
+                    <a:lstStyle/>
+                    <a:p>
+                      <a:endParaRPr lang="en-US" dirty="0"/>
+                    </a:p>
+                  </a:txBody>
+                  <a:tcPr/>
+                </a:tc>
+              </a:tr>
+            </a:tbl>
+          </a:graphicData>
+        </a:graphic>
+      </p:graphicFrame>
+      <p:sp>
+        <p:nvSpPr>
+          <p:cNvPr id="5" name="TextBox 4"/>
+          <p:cNvSpPr txBox="1"/>
+          <p:nvPr/>
+        </p:nvSpPr>
+        <p:spPr>
+          <a:xfrm>
+            <a:off x="759854" y="2266682"/>
+            <a:ext cx="5241701" cy="369332"/>
+          </a:xfrm>
+          <a:prstGeom prst="rect">
+            <a:avLst/>
+          </a:prstGeom>
+          <a:noFill/>
+        </p:spPr>
+        <p:txBody>
+          <a:bodyPr wrap="square" rtlCol="0">
+            <a:spAutoFit/>
+          </a:bodyPr>
+          <a:lstStyle/>
+          <a:p>
+            <a:r>
+              <a:rPr lang="en-US" dirty="0" smtClean="0"/>
+              <a:t>Fill the row from right to left</a:t>
+            </a:r>
+          </a:p>
+        </p:txBody>
+      </p:sp>
+      <p:sp>
+        <p:nvSpPr>
+          <p:cNvPr id="6" name="Down Arrow 5"/>
+          <p:cNvSpPr/>
+          <p:nvPr/>
+        </p:nvSpPr>
+        <p:spPr>
+          <a:xfrm rot="5400000">
+            <a:off x="5940379" y="2733541"/>
+            <a:ext cx="1030309" cy="4192073"/>
+          </a:xfrm>
+          <a:prstGeom prst="downArrow">
+            <a:avLst/>
+          </a:prstGeom>
+        </p:spPr>
+        <p:style>
+          <a:lnRef idx="2">
+            <a:schemeClr val="accent1">
+              <a:shade val="50000"/>
+            </a:schemeClr>
+          </a:lnRef>
+          <a:fillRef idx="1">
+            <a:schemeClr val="accent1"/>
+          </a:fillRef>
+          <a:effectRef idx="0">
+            <a:schemeClr val="accent1"/>
+          </a:effectRef>
+          <a:fontRef idx="minor">
+            <a:schemeClr val="lt1"/>
+          </a:fontRef>
+        </p:style>
+        <p:txBody>
+          <a:bodyPr rtlCol="0" anchor="ctr"/>
+          <a:lstStyle/>
+          <a:p>
+            <a:pPr algn="ctr"/>
+            <a:endParaRPr lang="en-US"/>
+          </a:p>
+        </p:txBody>
+      </p:sp>
+    </p:spTree>
+    <p:extLst>
+      <p:ext uri="{BB962C8B-B14F-4D97-AF65-F5344CB8AC3E}">
+        <p14:creationId xmlns:p14="http://schemas.microsoft.com/office/powerpoint/2010/main" val="713519769"/>
+      </p:ext>
+    </p:extLst>
+  </p:cSld>
+  <p:clrMapOvr>
+    <a:masterClrMapping/>
+  </p:clrMapOvr>
+</p:sld>
+</file>
+
+<file path=ppt/slides/slide13.xml><?xml version="1.0" encoding="utf-8"?>
+<p:sld xmlns:a="http://schemas.openxmlformats.org/drawingml/2006/main" xmlns:r="http://schemas.openxmlformats.org/officeDocument/2006/relationships" xmlns:p="http://schemas.openxmlformats.org/presentationml/2006/main">
+  <p:cSld>
+    <p:spTree>
+      <p:nvGrpSpPr>
+        <p:cNvPr id="1" name=""/>
+        <p:cNvGrpSpPr/>
+        <p:nvPr/>
+      </p:nvGrpSpPr>
+      <p:grpSpPr>
+        <a:xfrm>
+          <a:off x="0" y="0"/>
+          <a:ext cx="0" cy="0"/>
+          <a:chOff x="0" y="0"/>
+          <a:chExt cx="0" cy="0"/>
+        </a:xfrm>
+      </p:grpSpPr>
+      <p:sp>
+        <p:nvSpPr>
+          <p:cNvPr id="2" name="Title 1"/>
+          <p:cNvSpPr>
+            <a:spLocks noGrp="1"/>
+          </p:cNvSpPr>
+          <p:nvPr>
+            <p:ph type="title"/>
+          </p:nvPr>
+        </p:nvSpPr>
+        <p:spPr/>
+        <p:txBody>
+          <a:bodyPr>
+            <a:normAutofit/>
+          </a:bodyPr>
+          <a:lstStyle/>
+          <a:p>
+            <a:r>
+              <a:rPr lang="en-US" sz="4400" dirty="0" smtClean="0"/>
+              <a:t>Complexities</a:t>
+            </a:r>
+            <a:endParaRPr lang="en-US" sz="4400" dirty="0"/>
+          </a:p>
+        </p:txBody>
+      </p:sp>
+      <p:sp>
+        <p:nvSpPr>
+          <p:cNvPr id="3" name="Rectangle 2"/>
+          <p:cNvSpPr/>
+          <p:nvPr/>
+        </p:nvSpPr>
+        <p:spPr>
+          <a:xfrm>
+            <a:off x="910107" y="2497985"/>
+            <a:ext cx="6096000" cy="954107"/>
+          </a:xfrm>
+          <a:prstGeom prst="rect">
+            <a:avLst/>
+          </a:prstGeom>
+        </p:spPr>
+        <p:txBody>
+          <a:bodyPr>
+            <a:spAutoFit/>
+          </a:bodyPr>
+          <a:lstStyle/>
+          <a:p>
+            <a:r>
+              <a:rPr lang="en-US" sz="2800" b="1" dirty="0"/>
+              <a:t>Time Complexity: </a:t>
+            </a:r>
+            <a:r>
+              <a:rPr lang="en-US" sz="2800" dirty="0" smtClean="0"/>
+              <a:t>O(N*W)</a:t>
+            </a:r>
+            <a:r>
+              <a:rPr lang="en-US" sz="2800" dirty="0"/>
+              <a:t/>
+            </a:r>
+            <a:br>
+              <a:rPr lang="en-US" sz="2800" dirty="0"/>
+            </a:br>
+            <a:r>
+              <a:rPr lang="en-US" sz="2800" b="1" dirty="0"/>
+              <a:t>Auxiliary Space: </a:t>
+            </a:r>
+            <a:r>
+              <a:rPr lang="en-US" sz="2800" dirty="0" smtClean="0"/>
+              <a:t>O(W)</a:t>
+            </a:r>
+            <a:endParaRPr lang="en-US" sz="2800" dirty="0"/>
+          </a:p>
+        </p:txBody>
+      </p:sp>
+    </p:spTree>
+    <p:extLst>
+      <p:ext uri="{BB962C8B-B14F-4D97-AF65-F5344CB8AC3E}">
+        <p14:creationId xmlns:p14="http://schemas.microsoft.com/office/powerpoint/2010/main" val="1348851083"/>
       </p:ext>
     </p:extLst>
   </p:cSld>
@@ -5915,7 +6875,7 @@
           <p:cNvPr id="2" name="Title 1">
             <a:extLst>
               <a:ext uri="{FF2B5EF4-FFF2-40B4-BE49-F238E27FC236}">
-                <a16:creationId xmlns:a16="http://schemas.microsoft.com/office/drawing/2014/main" id="{B1FBB116-76E9-140E-F12D-BA1793D52BA1}"/>
+                <a16:creationId xmlns="" xmlns:a16="http://schemas.microsoft.com/office/drawing/2014/main" id="{B1FBB116-76E9-140E-F12D-BA1793D52BA1}"/>
               </a:ext>
             </a:extLst>
           </p:cNvPr>
@@ -5943,7 +6903,7 @@
           <p:cNvPr id="3" name="Content Placeholder 2">
             <a:extLst>
               <a:ext uri="{FF2B5EF4-FFF2-40B4-BE49-F238E27FC236}">
-                <a16:creationId xmlns:a16="http://schemas.microsoft.com/office/drawing/2014/main" id="{1458319D-3A92-8CB8-F0A8-51008F48F3B4}"/>
+                <a16:creationId xmlns="" xmlns:a16="http://schemas.microsoft.com/office/drawing/2014/main" id="{1458319D-3A92-8CB8-F0A8-51008F48F3B4}"/>
               </a:ext>
             </a:extLst>
           </p:cNvPr>
@@ -6087,7 +7047,7 @@
           <p:cNvPr id="2" name="Title 1">
             <a:extLst>
               <a:ext uri="{FF2B5EF4-FFF2-40B4-BE49-F238E27FC236}">
-                <a16:creationId xmlns:a16="http://schemas.microsoft.com/office/drawing/2014/main" id="{A64EE33C-DF13-4636-1357-39249B5715F1}"/>
+                <a16:creationId xmlns="" xmlns:a16="http://schemas.microsoft.com/office/drawing/2014/main" id="{A64EE33C-DF13-4636-1357-39249B5715F1}"/>
               </a:ext>
             </a:extLst>
           </p:cNvPr>
@@ -6115,7 +7075,7 @@
           <p:cNvPr id="3" name="Content Placeholder 2">
             <a:extLst>
               <a:ext uri="{FF2B5EF4-FFF2-40B4-BE49-F238E27FC236}">
-                <a16:creationId xmlns:a16="http://schemas.microsoft.com/office/drawing/2014/main" id="{28EFF30C-4682-295A-882C-35098CD3A288}"/>
+                <a16:creationId xmlns="" xmlns:a16="http://schemas.microsoft.com/office/drawing/2014/main" id="{28EFF30C-4682-295A-882C-35098CD3A288}"/>
               </a:ext>
             </a:extLst>
           </p:cNvPr>
@@ -6179,6 +7139,10 @@
                 <a:latin typeface="urw-din"/>
               </a:rPr>
               <a:t>.</a:t>
+            </a:r>
+            <a:r>
+              <a:rPr lang="en-US" dirty="0"/>
+              <a:t/>
             </a:r>
             <a:br>
               <a:rPr lang="en-US" dirty="0"/>
@@ -6348,7 +7312,7 @@
           <p:cNvPr id="2" name="Rectangle 1">
             <a:extLst>
               <a:ext uri="{FF2B5EF4-FFF2-40B4-BE49-F238E27FC236}">
-                <a16:creationId xmlns:a16="http://schemas.microsoft.com/office/drawing/2014/main" id="{6C1076DC-6824-3B6F-3028-779B438A736D}"/>
+                <a16:creationId xmlns="" xmlns:a16="http://schemas.microsoft.com/office/drawing/2014/main" id="{6C1076DC-6824-3B6F-3028-779B438A736D}"/>
               </a:ext>
             </a:extLst>
           </p:cNvPr>
@@ -6357,8 +7321,8 @@
         </p:nvSpPr>
         <p:spPr>
           <a:xfrm>
-            <a:off x="7025951" y="1698171"/>
-            <a:ext cx="2481943" cy="4292082"/>
+            <a:off x="5235788" y="2417573"/>
+            <a:ext cx="2481943" cy="2756079"/>
           </a:xfrm>
           <a:prstGeom prst="rect">
             <a:avLst/>
@@ -6394,7 +7358,7 @@
           <p:cNvPr id="4" name="TextBox 3">
             <a:extLst>
               <a:ext uri="{FF2B5EF4-FFF2-40B4-BE49-F238E27FC236}">
-                <a16:creationId xmlns:a16="http://schemas.microsoft.com/office/drawing/2014/main" id="{04D213EA-4A69-1DAA-88FB-7DDA9DA94891}"/>
+                <a16:creationId xmlns="" xmlns:a16="http://schemas.microsoft.com/office/drawing/2014/main" id="{04D213EA-4A69-1DAA-88FB-7DDA9DA94891}"/>
               </a:ext>
             </a:extLst>
           </p:cNvPr>
@@ -6403,8 +7367,8 @@
         </p:nvSpPr>
         <p:spPr>
           <a:xfrm>
-            <a:off x="7343192" y="3610947"/>
-            <a:ext cx="1744824" cy="369332"/>
+            <a:off x="5553029" y="3478503"/>
+            <a:ext cx="1744824" cy="646331"/>
           </a:xfrm>
           <a:prstGeom prst="rect">
             <a:avLst/>
@@ -6424,8 +7388,32 @@
                   <a:schemeClr val="bg1"/>
                 </a:solidFill>
               </a:rPr>
-              <a:t>7 kgs</a:t>
-            </a:r>
+              <a:t>7 </a:t>
+            </a:r>
+            <a:r>
+              <a:rPr lang="en-IN" dirty="0" smtClean="0">
+                <a:solidFill>
+                  <a:schemeClr val="bg1"/>
+                </a:solidFill>
+              </a:rPr>
+              <a:t>Kg</a:t>
+            </a:r>
+          </a:p>
+          <a:p>
+            <a:pPr algn="ctr"/>
+            <a:r>
+              <a:rPr lang="en-IN" dirty="0" smtClean="0">
+                <a:solidFill>
+                  <a:schemeClr val="bg1"/>
+                </a:solidFill>
+              </a:rPr>
+              <a:t>Max Value?</a:t>
+            </a:r>
+            <a:endParaRPr lang="en-IN" dirty="0">
+              <a:solidFill>
+                <a:schemeClr val="bg1"/>
+              </a:solidFill>
+            </a:endParaRPr>
           </a:p>
         </p:txBody>
       </p:sp>
@@ -6434,7 +7422,7 @@
           <p:cNvPr id="5" name="Oval 4">
             <a:extLst>
               <a:ext uri="{FF2B5EF4-FFF2-40B4-BE49-F238E27FC236}">
-                <a16:creationId xmlns:a16="http://schemas.microsoft.com/office/drawing/2014/main" id="{A014A2FF-66C4-AACD-5BDB-4B8044D6D938}"/>
+                <a16:creationId xmlns="" xmlns:a16="http://schemas.microsoft.com/office/drawing/2014/main" id="{A014A2FF-66C4-AACD-5BDB-4B8044D6D938}"/>
               </a:ext>
             </a:extLst>
           </p:cNvPr>
@@ -6486,7 +7474,7 @@
           <p:cNvPr id="10" name="TextBox 9">
             <a:extLst>
               <a:ext uri="{FF2B5EF4-FFF2-40B4-BE49-F238E27FC236}">
-                <a16:creationId xmlns:a16="http://schemas.microsoft.com/office/drawing/2014/main" id="{4E1B0DB8-D316-84C3-006A-82172816D5C9}"/>
+                <a16:creationId xmlns="" xmlns:a16="http://schemas.microsoft.com/office/drawing/2014/main" id="{4E1B0DB8-D316-84C3-006A-82172816D5C9}"/>
               </a:ext>
             </a:extLst>
           </p:cNvPr>
@@ -6535,7 +7523,7 @@
           <p:cNvPr id="11" name="Oval 10">
             <a:extLst>
               <a:ext uri="{FF2B5EF4-FFF2-40B4-BE49-F238E27FC236}">
-                <a16:creationId xmlns:a16="http://schemas.microsoft.com/office/drawing/2014/main" id="{75CC4F88-36C2-3B5C-2B28-CE40F33B9065}"/>
+                <a16:creationId xmlns="" xmlns:a16="http://schemas.microsoft.com/office/drawing/2014/main" id="{75CC4F88-36C2-3B5C-2B28-CE40F33B9065}"/>
               </a:ext>
             </a:extLst>
           </p:cNvPr>
@@ -6587,7 +7575,7 @@
           <p:cNvPr id="12" name="TextBox 11">
             <a:extLst>
               <a:ext uri="{FF2B5EF4-FFF2-40B4-BE49-F238E27FC236}">
-                <a16:creationId xmlns:a16="http://schemas.microsoft.com/office/drawing/2014/main" id="{42BAE035-6DB5-70E5-AD04-548A74354F82}"/>
+                <a16:creationId xmlns="" xmlns:a16="http://schemas.microsoft.com/office/drawing/2014/main" id="{42BAE035-6DB5-70E5-AD04-548A74354F82}"/>
               </a:ext>
             </a:extLst>
           </p:cNvPr>
@@ -6636,7 +7624,7 @@
           <p:cNvPr id="13" name="Oval 12">
             <a:extLst>
               <a:ext uri="{FF2B5EF4-FFF2-40B4-BE49-F238E27FC236}">
-                <a16:creationId xmlns:a16="http://schemas.microsoft.com/office/drawing/2014/main" id="{1B62A21E-05AF-C9F5-67F5-7D75F81B8B2C}"/>
+                <a16:creationId xmlns="" xmlns:a16="http://schemas.microsoft.com/office/drawing/2014/main" id="{1B62A21E-05AF-C9F5-67F5-7D75F81B8B2C}"/>
               </a:ext>
             </a:extLst>
           </p:cNvPr>
@@ -6688,7 +7676,7 @@
           <p:cNvPr id="14" name="TextBox 13">
             <a:extLst>
               <a:ext uri="{FF2B5EF4-FFF2-40B4-BE49-F238E27FC236}">
-                <a16:creationId xmlns:a16="http://schemas.microsoft.com/office/drawing/2014/main" id="{5A623425-AE51-CE4D-9060-4EB9BBBC7FF0}"/>
+                <a16:creationId xmlns="" xmlns:a16="http://schemas.microsoft.com/office/drawing/2014/main" id="{5A623425-AE51-CE4D-9060-4EB9BBBC7FF0}"/>
               </a:ext>
             </a:extLst>
           </p:cNvPr>
@@ -6737,7 +7725,7 @@
           <p:cNvPr id="15" name="Oval 14">
             <a:extLst>
               <a:ext uri="{FF2B5EF4-FFF2-40B4-BE49-F238E27FC236}">
-                <a16:creationId xmlns:a16="http://schemas.microsoft.com/office/drawing/2014/main" id="{F67A78BA-A0E5-5091-4DFA-41CCB4F61937}"/>
+                <a16:creationId xmlns="" xmlns:a16="http://schemas.microsoft.com/office/drawing/2014/main" id="{F67A78BA-A0E5-5091-4DFA-41CCB4F61937}"/>
               </a:ext>
             </a:extLst>
           </p:cNvPr>
@@ -6789,7 +7777,7 @@
           <p:cNvPr id="16" name="TextBox 15">
             <a:extLst>
               <a:ext uri="{FF2B5EF4-FFF2-40B4-BE49-F238E27FC236}">
-                <a16:creationId xmlns:a16="http://schemas.microsoft.com/office/drawing/2014/main" id="{2599F2A8-DB15-E867-D190-A6E55D8AECF5}"/>
+                <a16:creationId xmlns="" xmlns:a16="http://schemas.microsoft.com/office/drawing/2014/main" id="{2599F2A8-DB15-E867-D190-A6E55D8AECF5}"/>
               </a:ext>
             </a:extLst>
           </p:cNvPr>
@@ -6838,7 +7826,7 @@
           <p:cNvPr id="17" name="Oval 16">
             <a:extLst>
               <a:ext uri="{FF2B5EF4-FFF2-40B4-BE49-F238E27FC236}">
-                <a16:creationId xmlns:a16="http://schemas.microsoft.com/office/drawing/2014/main" id="{B7C9B7C2-73E9-3944-475E-E1F66D2B18E2}"/>
+                <a16:creationId xmlns="" xmlns:a16="http://schemas.microsoft.com/office/drawing/2014/main" id="{B7C9B7C2-73E9-3944-475E-E1F66D2B18E2}"/>
               </a:ext>
             </a:extLst>
           </p:cNvPr>
@@ -6890,7 +7878,7 @@
           <p:cNvPr id="18" name="TextBox 17">
             <a:extLst>
               <a:ext uri="{FF2B5EF4-FFF2-40B4-BE49-F238E27FC236}">
-                <a16:creationId xmlns:a16="http://schemas.microsoft.com/office/drawing/2014/main" id="{EB8BECF8-6F59-0F77-B18F-D62966B73156}"/>
+                <a16:creationId xmlns="" xmlns:a16="http://schemas.microsoft.com/office/drawing/2014/main" id="{EB8BECF8-6F59-0F77-B18F-D62966B73156}"/>
               </a:ext>
             </a:extLst>
           </p:cNvPr>
@@ -6934,12 +7922,42 @@
           </a:p>
         </p:txBody>
       </p:sp>
-      <p:sp>
-        <p:nvSpPr>
-          <p:cNvPr id="19" name="Rectangle: Top Corners Rounded 18">
+    </p:spTree>
+    <p:extLst>
+      <p:ext uri="{BB962C8B-B14F-4D97-AF65-F5344CB8AC3E}">
+        <p14:creationId xmlns:p14="http://schemas.microsoft.com/office/powerpoint/2010/main" val="3015747920"/>
+      </p:ext>
+    </p:extLst>
+  </p:cSld>
+  <p:clrMapOvr>
+    <a:masterClrMapping/>
+  </p:clrMapOvr>
+</p:sld>
+</file>
+
+<file path=ppt/slides/slide5.xml><?xml version="1.0" encoding="utf-8"?>
+<p:sld xmlns:a="http://schemas.openxmlformats.org/drawingml/2006/main" xmlns:r="http://schemas.openxmlformats.org/officeDocument/2006/relationships" xmlns:p="http://schemas.openxmlformats.org/presentationml/2006/main">
+  <p:cSld>
+    <p:spTree>
+      <p:nvGrpSpPr>
+        <p:cNvPr id="1" name=""/>
+        <p:cNvGrpSpPr/>
+        <p:nvPr/>
+      </p:nvGrpSpPr>
+      <p:grpSpPr>
+        <a:xfrm>
+          <a:off x="0" y="0"/>
+          <a:ext cx="0" cy="0"/>
+          <a:chOff x="0" y="0"/>
+          <a:chExt cx="0" cy="0"/>
+        </a:xfrm>
+      </p:grpSpPr>
+      <p:sp>
+        <p:nvSpPr>
+          <p:cNvPr id="2" name="Rectangle 1">
             <a:extLst>
               <a:ext uri="{FF2B5EF4-FFF2-40B4-BE49-F238E27FC236}">
-                <a16:creationId xmlns:a16="http://schemas.microsoft.com/office/drawing/2014/main" id="{7C4C9C89-39D9-E6BB-4DB8-AE92C1E7A448}"/>
+                <a16:creationId xmlns="" xmlns:a16="http://schemas.microsoft.com/office/drawing/2014/main" id="{6C1076DC-6824-3B6F-3028-779B438A736D}"/>
               </a:ext>
             </a:extLst>
           </p:cNvPr>
@@ -6948,10 +7966,10 @@
         </p:nvSpPr>
         <p:spPr>
           <a:xfrm>
-            <a:off x="8537510" y="2771192"/>
-            <a:ext cx="914400" cy="914400"/>
+            <a:off x="5235788" y="2417573"/>
+            <a:ext cx="2481943" cy="2756079"/>
           </a:xfrm>
-          <a:prstGeom prst="round2SameRect">
+          <a:prstGeom prst="rect">
             <a:avLst/>
           </a:prstGeom>
         </p:spPr>
@@ -6980,10 +7998,1848 @@
           </a:p>
         </p:txBody>
       </p:sp>
+      <p:sp>
+        <p:nvSpPr>
+          <p:cNvPr id="4" name="TextBox 3">
+            <a:extLst>
+              <a:ext uri="{FF2B5EF4-FFF2-40B4-BE49-F238E27FC236}">
+                <a16:creationId xmlns="" xmlns:a16="http://schemas.microsoft.com/office/drawing/2014/main" id="{04D213EA-4A69-1DAA-88FB-7DDA9DA94891}"/>
+              </a:ext>
+            </a:extLst>
+          </p:cNvPr>
+          <p:cNvSpPr txBox="1"/>
+          <p:nvPr/>
+        </p:nvSpPr>
+        <p:spPr>
+          <a:xfrm>
+            <a:off x="5553029" y="3478503"/>
+            <a:ext cx="1744824" cy="646331"/>
+          </a:xfrm>
+          <a:prstGeom prst="rect">
+            <a:avLst/>
+          </a:prstGeom>
+          <a:noFill/>
+        </p:spPr>
+        <p:txBody>
+          <a:bodyPr wrap="square" rtlCol="0">
+            <a:spAutoFit/>
+          </a:bodyPr>
+          <a:lstStyle/>
+          <a:p>
+            <a:pPr algn="ctr"/>
+            <a:r>
+              <a:rPr lang="en-IN" dirty="0" smtClean="0">
+                <a:solidFill>
+                  <a:schemeClr val="bg1"/>
+                </a:solidFill>
+              </a:rPr>
+              <a:t>Total </a:t>
+            </a:r>
+            <a:r>
+              <a:rPr lang="en-IN" dirty="0">
+                <a:solidFill>
+                  <a:schemeClr val="bg1"/>
+                </a:solidFill>
+              </a:rPr>
+              <a:t>7</a:t>
+            </a:r>
+            <a:r>
+              <a:rPr lang="en-IN" dirty="0" smtClean="0">
+                <a:solidFill>
+                  <a:schemeClr val="bg1"/>
+                </a:solidFill>
+              </a:rPr>
+              <a:t> balls</a:t>
+            </a:r>
+          </a:p>
+          <a:p>
+            <a:pPr algn="ctr"/>
+            <a:r>
+              <a:rPr lang="en-IN" dirty="0" smtClean="0">
+                <a:solidFill>
+                  <a:schemeClr val="bg1"/>
+                </a:solidFill>
+              </a:rPr>
+              <a:t>Max Runs?</a:t>
+            </a:r>
+            <a:endParaRPr lang="en-IN" dirty="0" smtClean="0">
+              <a:solidFill>
+                <a:schemeClr val="bg1"/>
+              </a:solidFill>
+            </a:endParaRPr>
+          </a:p>
+        </p:txBody>
+      </p:sp>
+      <p:sp>
+        <p:nvSpPr>
+          <p:cNvPr id="5" name="Oval 4">
+            <a:extLst>
+              <a:ext uri="{FF2B5EF4-FFF2-40B4-BE49-F238E27FC236}">
+                <a16:creationId xmlns="" xmlns:a16="http://schemas.microsoft.com/office/drawing/2014/main" id="{A014A2FF-66C4-AACD-5BDB-4B8044D6D938}"/>
+              </a:ext>
+            </a:extLst>
+          </p:cNvPr>
+          <p:cNvSpPr/>
+          <p:nvPr/>
+        </p:nvSpPr>
+        <p:spPr>
+          <a:xfrm>
+            <a:off x="690465" y="1698172"/>
+            <a:ext cx="1194319" cy="1184988"/>
+          </a:xfrm>
+          <a:prstGeom prst="ellipse">
+            <a:avLst/>
+          </a:prstGeom>
+          <a:solidFill>
+            <a:schemeClr val="accent2">
+              <a:lumMod val="60000"/>
+              <a:lumOff val="40000"/>
+            </a:schemeClr>
+          </a:solidFill>
+        </p:spPr>
+        <p:style>
+          <a:lnRef idx="2">
+            <a:schemeClr val="accent1">
+              <a:shade val="50000"/>
+            </a:schemeClr>
+          </a:lnRef>
+          <a:fillRef idx="1">
+            <a:schemeClr val="accent1"/>
+          </a:fillRef>
+          <a:effectRef idx="0">
+            <a:schemeClr val="accent1"/>
+          </a:effectRef>
+          <a:fontRef idx="minor">
+            <a:schemeClr val="lt1"/>
+          </a:fontRef>
+        </p:style>
+        <p:txBody>
+          <a:bodyPr rtlCol="0" anchor="ctr"/>
+          <a:lstStyle/>
+          <a:p>
+            <a:pPr algn="ctr"/>
+            <a:endParaRPr lang="en-IN"/>
+          </a:p>
+        </p:txBody>
+      </p:sp>
+      <p:sp>
+        <p:nvSpPr>
+          <p:cNvPr id="10" name="TextBox 9">
+            <a:extLst>
+              <a:ext uri="{FF2B5EF4-FFF2-40B4-BE49-F238E27FC236}">
+                <a16:creationId xmlns="" xmlns:a16="http://schemas.microsoft.com/office/drawing/2014/main" id="{4E1B0DB8-D316-84C3-006A-82172816D5C9}"/>
+              </a:ext>
+            </a:extLst>
+          </p:cNvPr>
+          <p:cNvSpPr txBox="1"/>
+          <p:nvPr/>
+        </p:nvSpPr>
+        <p:spPr>
+          <a:xfrm>
+            <a:off x="839755" y="2034072"/>
+            <a:ext cx="1182228" cy="646331"/>
+          </a:xfrm>
+          <a:prstGeom prst="rect">
+            <a:avLst/>
+          </a:prstGeom>
+          <a:noFill/>
+        </p:spPr>
+        <p:txBody>
+          <a:bodyPr wrap="square" rtlCol="0">
+            <a:spAutoFit/>
+          </a:bodyPr>
+          <a:lstStyle/>
+          <a:p>
+            <a:r>
+              <a:rPr lang="en-IN" dirty="0" smtClean="0">
+                <a:solidFill>
+                  <a:schemeClr val="bg1"/>
+                </a:solidFill>
+              </a:rPr>
+              <a:t>15 Runs</a:t>
+            </a:r>
+            <a:endParaRPr lang="en-IN" dirty="0">
+              <a:solidFill>
+                <a:schemeClr val="bg1"/>
+              </a:solidFill>
+            </a:endParaRPr>
+          </a:p>
+          <a:p>
+            <a:r>
+              <a:rPr lang="en-IN" dirty="0">
+                <a:solidFill>
+                  <a:schemeClr val="bg1"/>
+                </a:solidFill>
+              </a:rPr>
+              <a:t>2 </a:t>
+            </a:r>
+            <a:r>
+              <a:rPr lang="en-IN" dirty="0" smtClean="0">
+                <a:solidFill>
+                  <a:schemeClr val="bg1"/>
+                </a:solidFill>
+              </a:rPr>
+              <a:t>Balls</a:t>
+            </a:r>
+            <a:endParaRPr lang="en-IN" dirty="0">
+              <a:solidFill>
+                <a:schemeClr val="bg1"/>
+              </a:solidFill>
+            </a:endParaRPr>
+          </a:p>
+        </p:txBody>
+      </p:sp>
+      <p:sp>
+        <p:nvSpPr>
+          <p:cNvPr id="11" name="Oval 10">
+            <a:extLst>
+              <a:ext uri="{FF2B5EF4-FFF2-40B4-BE49-F238E27FC236}">
+                <a16:creationId xmlns="" xmlns:a16="http://schemas.microsoft.com/office/drawing/2014/main" id="{75CC4F88-36C2-3B5C-2B28-CE40F33B9065}"/>
+              </a:ext>
+            </a:extLst>
+          </p:cNvPr>
+          <p:cNvSpPr/>
+          <p:nvPr/>
+        </p:nvSpPr>
+        <p:spPr>
+          <a:xfrm>
+            <a:off x="2783632" y="1698172"/>
+            <a:ext cx="1194319" cy="1184988"/>
+          </a:xfrm>
+          <a:prstGeom prst="ellipse">
+            <a:avLst/>
+          </a:prstGeom>
+          <a:solidFill>
+            <a:schemeClr val="accent2">
+              <a:lumMod val="60000"/>
+              <a:lumOff val="40000"/>
+            </a:schemeClr>
+          </a:solidFill>
+        </p:spPr>
+        <p:style>
+          <a:lnRef idx="2">
+            <a:schemeClr val="accent1">
+              <a:shade val="50000"/>
+            </a:schemeClr>
+          </a:lnRef>
+          <a:fillRef idx="1">
+            <a:schemeClr val="accent1"/>
+          </a:fillRef>
+          <a:effectRef idx="0">
+            <a:schemeClr val="accent1"/>
+          </a:effectRef>
+          <a:fontRef idx="minor">
+            <a:schemeClr val="lt1"/>
+          </a:fontRef>
+        </p:style>
+        <p:txBody>
+          <a:bodyPr rtlCol="0" anchor="ctr"/>
+          <a:lstStyle/>
+          <a:p>
+            <a:pPr algn="ctr"/>
+            <a:endParaRPr lang="en-IN"/>
+          </a:p>
+        </p:txBody>
+      </p:sp>
+      <p:sp>
+        <p:nvSpPr>
+          <p:cNvPr id="12" name="TextBox 11">
+            <a:extLst>
+              <a:ext uri="{FF2B5EF4-FFF2-40B4-BE49-F238E27FC236}">
+                <a16:creationId xmlns="" xmlns:a16="http://schemas.microsoft.com/office/drawing/2014/main" id="{42BAE035-6DB5-70E5-AD04-548A74354F82}"/>
+              </a:ext>
+            </a:extLst>
+          </p:cNvPr>
+          <p:cNvSpPr txBox="1"/>
+          <p:nvPr/>
+        </p:nvSpPr>
+        <p:spPr>
+          <a:xfrm>
+            <a:off x="2932921" y="2034073"/>
+            <a:ext cx="1045029" cy="646331"/>
+          </a:xfrm>
+          <a:prstGeom prst="rect">
+            <a:avLst/>
+          </a:prstGeom>
+          <a:noFill/>
+        </p:spPr>
+        <p:txBody>
+          <a:bodyPr wrap="square" rtlCol="0">
+            <a:spAutoFit/>
+          </a:bodyPr>
+          <a:lstStyle/>
+          <a:p>
+            <a:r>
+              <a:rPr lang="en-IN" dirty="0" smtClean="0">
+                <a:solidFill>
+                  <a:schemeClr val="bg1"/>
+                </a:solidFill>
+              </a:rPr>
+              <a:t>14 Runs</a:t>
+            </a:r>
+            <a:endParaRPr lang="en-IN" dirty="0">
+              <a:solidFill>
+                <a:schemeClr val="bg1"/>
+              </a:solidFill>
+            </a:endParaRPr>
+          </a:p>
+          <a:p>
+            <a:r>
+              <a:rPr lang="en-IN" dirty="0">
+                <a:solidFill>
+                  <a:schemeClr val="bg1"/>
+                </a:solidFill>
+              </a:rPr>
+              <a:t>5 </a:t>
+            </a:r>
+            <a:r>
+              <a:rPr lang="en-IN" dirty="0" smtClean="0">
+                <a:solidFill>
+                  <a:schemeClr val="bg1"/>
+                </a:solidFill>
+              </a:rPr>
+              <a:t>Balls</a:t>
+            </a:r>
+            <a:endParaRPr lang="en-IN" dirty="0">
+              <a:solidFill>
+                <a:schemeClr val="bg1"/>
+              </a:solidFill>
+            </a:endParaRPr>
+          </a:p>
+        </p:txBody>
+      </p:sp>
+      <p:sp>
+        <p:nvSpPr>
+          <p:cNvPr id="13" name="Oval 12">
+            <a:extLst>
+              <a:ext uri="{FF2B5EF4-FFF2-40B4-BE49-F238E27FC236}">
+                <a16:creationId xmlns="" xmlns:a16="http://schemas.microsoft.com/office/drawing/2014/main" id="{1B62A21E-05AF-C9F5-67F5-7D75F81B8B2C}"/>
+              </a:ext>
+            </a:extLst>
+          </p:cNvPr>
+          <p:cNvSpPr/>
+          <p:nvPr/>
+        </p:nvSpPr>
+        <p:spPr>
+          <a:xfrm>
+            <a:off x="681134" y="5397759"/>
+            <a:ext cx="1194319" cy="1184988"/>
+          </a:xfrm>
+          <a:prstGeom prst="ellipse">
+            <a:avLst/>
+          </a:prstGeom>
+          <a:solidFill>
+            <a:schemeClr val="accent2">
+              <a:lumMod val="60000"/>
+              <a:lumOff val="40000"/>
+            </a:schemeClr>
+          </a:solidFill>
+        </p:spPr>
+        <p:style>
+          <a:lnRef idx="2">
+            <a:schemeClr val="accent1">
+              <a:shade val="50000"/>
+            </a:schemeClr>
+          </a:lnRef>
+          <a:fillRef idx="1">
+            <a:schemeClr val="accent1"/>
+          </a:fillRef>
+          <a:effectRef idx="0">
+            <a:schemeClr val="accent1"/>
+          </a:effectRef>
+          <a:fontRef idx="minor">
+            <a:schemeClr val="lt1"/>
+          </a:fontRef>
+        </p:style>
+        <p:txBody>
+          <a:bodyPr rtlCol="0" anchor="ctr"/>
+          <a:lstStyle/>
+          <a:p>
+            <a:pPr algn="ctr"/>
+            <a:endParaRPr lang="en-IN"/>
+          </a:p>
+        </p:txBody>
+      </p:sp>
+      <p:sp>
+        <p:nvSpPr>
+          <p:cNvPr id="14" name="TextBox 13">
+            <a:extLst>
+              <a:ext uri="{FF2B5EF4-FFF2-40B4-BE49-F238E27FC236}">
+                <a16:creationId xmlns="" xmlns:a16="http://schemas.microsoft.com/office/drawing/2014/main" id="{5A623425-AE51-CE4D-9060-4EB9BBBC7FF0}"/>
+              </a:ext>
+            </a:extLst>
+          </p:cNvPr>
+          <p:cNvSpPr txBox="1"/>
+          <p:nvPr/>
+        </p:nvSpPr>
+        <p:spPr>
+          <a:xfrm>
+            <a:off x="830423" y="5733660"/>
+            <a:ext cx="1026367" cy="646331"/>
+          </a:xfrm>
+          <a:prstGeom prst="rect">
+            <a:avLst/>
+          </a:prstGeom>
+          <a:noFill/>
+        </p:spPr>
+        <p:txBody>
+          <a:bodyPr wrap="square" rtlCol="0">
+            <a:spAutoFit/>
+          </a:bodyPr>
+          <a:lstStyle/>
+          <a:p>
+            <a:r>
+              <a:rPr lang="en-IN" dirty="0" smtClean="0">
+                <a:solidFill>
+                  <a:schemeClr val="bg1"/>
+                </a:solidFill>
+              </a:rPr>
+              <a:t>45 Runs</a:t>
+            </a:r>
+          </a:p>
+          <a:p>
+            <a:r>
+              <a:rPr lang="en-IN" dirty="0" smtClean="0">
+                <a:solidFill>
+                  <a:schemeClr val="bg1"/>
+                </a:solidFill>
+              </a:rPr>
+              <a:t>3 Balls</a:t>
+            </a:r>
+            <a:endParaRPr lang="en-IN" dirty="0">
+              <a:solidFill>
+                <a:schemeClr val="bg1"/>
+              </a:solidFill>
+            </a:endParaRPr>
+          </a:p>
+        </p:txBody>
+      </p:sp>
+      <p:sp>
+        <p:nvSpPr>
+          <p:cNvPr id="15" name="Oval 14">
+            <a:extLst>
+              <a:ext uri="{FF2B5EF4-FFF2-40B4-BE49-F238E27FC236}">
+                <a16:creationId xmlns="" xmlns:a16="http://schemas.microsoft.com/office/drawing/2014/main" id="{F67A78BA-A0E5-5091-4DFA-41CCB4F61937}"/>
+              </a:ext>
+            </a:extLst>
+          </p:cNvPr>
+          <p:cNvSpPr/>
+          <p:nvPr/>
+        </p:nvSpPr>
+        <p:spPr>
+          <a:xfrm>
+            <a:off x="3026229" y="5397759"/>
+            <a:ext cx="1194319" cy="1184988"/>
+          </a:xfrm>
+          <a:prstGeom prst="ellipse">
+            <a:avLst/>
+          </a:prstGeom>
+          <a:solidFill>
+            <a:schemeClr val="accent2">
+              <a:lumMod val="60000"/>
+              <a:lumOff val="40000"/>
+            </a:schemeClr>
+          </a:solidFill>
+        </p:spPr>
+        <p:style>
+          <a:lnRef idx="2">
+            <a:schemeClr val="accent1">
+              <a:shade val="50000"/>
+            </a:schemeClr>
+          </a:lnRef>
+          <a:fillRef idx="1">
+            <a:schemeClr val="accent1"/>
+          </a:fillRef>
+          <a:effectRef idx="0">
+            <a:schemeClr val="accent1"/>
+          </a:effectRef>
+          <a:fontRef idx="minor">
+            <a:schemeClr val="lt1"/>
+          </a:fontRef>
+        </p:style>
+        <p:txBody>
+          <a:bodyPr rtlCol="0" anchor="ctr"/>
+          <a:lstStyle/>
+          <a:p>
+            <a:pPr algn="ctr"/>
+            <a:endParaRPr lang="en-IN"/>
+          </a:p>
+        </p:txBody>
+      </p:sp>
+      <p:sp>
+        <p:nvSpPr>
+          <p:cNvPr id="16" name="TextBox 15">
+            <a:extLst>
+              <a:ext uri="{FF2B5EF4-FFF2-40B4-BE49-F238E27FC236}">
+                <a16:creationId xmlns="" xmlns:a16="http://schemas.microsoft.com/office/drawing/2014/main" id="{2599F2A8-DB15-E867-D190-A6E55D8AECF5}"/>
+              </a:ext>
+            </a:extLst>
+          </p:cNvPr>
+          <p:cNvSpPr txBox="1"/>
+          <p:nvPr/>
+        </p:nvSpPr>
+        <p:spPr>
+          <a:xfrm>
+            <a:off x="3175518" y="5733660"/>
+            <a:ext cx="1045029" cy="646331"/>
+          </a:xfrm>
+          <a:prstGeom prst="rect">
+            <a:avLst/>
+          </a:prstGeom>
+          <a:noFill/>
+        </p:spPr>
+        <p:txBody>
+          <a:bodyPr wrap="square" rtlCol="0">
+            <a:spAutoFit/>
+          </a:bodyPr>
+          <a:lstStyle/>
+          <a:p>
+            <a:r>
+              <a:rPr lang="en-IN" dirty="0" smtClean="0">
+                <a:solidFill>
+                  <a:schemeClr val="bg1"/>
+                </a:solidFill>
+              </a:rPr>
+              <a:t>30 Runs</a:t>
+            </a:r>
+          </a:p>
+          <a:p>
+            <a:r>
+              <a:rPr lang="en-IN" dirty="0" smtClean="0">
+                <a:solidFill>
+                  <a:schemeClr val="bg1"/>
+                </a:solidFill>
+              </a:rPr>
+              <a:t>4 Balls</a:t>
+            </a:r>
+            <a:endParaRPr lang="en-IN" dirty="0">
+              <a:solidFill>
+                <a:schemeClr val="bg1"/>
+              </a:solidFill>
+            </a:endParaRPr>
+          </a:p>
+        </p:txBody>
+      </p:sp>
+      <p:sp>
+        <p:nvSpPr>
+          <p:cNvPr id="17" name="Oval 16">
+            <a:extLst>
+              <a:ext uri="{FF2B5EF4-FFF2-40B4-BE49-F238E27FC236}">
+                <a16:creationId xmlns="" xmlns:a16="http://schemas.microsoft.com/office/drawing/2014/main" id="{B7C9B7C2-73E9-3944-475E-E1F66D2B18E2}"/>
+              </a:ext>
+            </a:extLst>
+          </p:cNvPr>
+          <p:cNvSpPr/>
+          <p:nvPr/>
+        </p:nvSpPr>
+        <p:spPr>
+          <a:xfrm>
+            <a:off x="1707502" y="3688703"/>
+            <a:ext cx="1194319" cy="1184988"/>
+          </a:xfrm>
+          <a:prstGeom prst="ellipse">
+            <a:avLst/>
+          </a:prstGeom>
+          <a:solidFill>
+            <a:schemeClr val="accent2">
+              <a:lumMod val="60000"/>
+              <a:lumOff val="40000"/>
+            </a:schemeClr>
+          </a:solidFill>
+        </p:spPr>
+        <p:style>
+          <a:lnRef idx="2">
+            <a:schemeClr val="accent1">
+              <a:shade val="50000"/>
+            </a:schemeClr>
+          </a:lnRef>
+          <a:fillRef idx="1">
+            <a:schemeClr val="accent1"/>
+          </a:fillRef>
+          <a:effectRef idx="0">
+            <a:schemeClr val="accent1"/>
+          </a:effectRef>
+          <a:fontRef idx="minor">
+            <a:schemeClr val="lt1"/>
+          </a:fontRef>
+        </p:style>
+        <p:txBody>
+          <a:bodyPr rtlCol="0" anchor="ctr"/>
+          <a:lstStyle/>
+          <a:p>
+            <a:pPr algn="ctr"/>
+            <a:endParaRPr lang="en-IN"/>
+          </a:p>
+        </p:txBody>
+      </p:sp>
+      <p:sp>
+        <p:nvSpPr>
+          <p:cNvPr id="18" name="TextBox 17">
+            <a:extLst>
+              <a:ext uri="{FF2B5EF4-FFF2-40B4-BE49-F238E27FC236}">
+                <a16:creationId xmlns="" xmlns:a16="http://schemas.microsoft.com/office/drawing/2014/main" id="{EB8BECF8-6F59-0F77-B18F-D62966B73156}"/>
+              </a:ext>
+            </a:extLst>
+          </p:cNvPr>
+          <p:cNvSpPr txBox="1"/>
+          <p:nvPr/>
+        </p:nvSpPr>
+        <p:spPr>
+          <a:xfrm>
+            <a:off x="1856791" y="4024603"/>
+            <a:ext cx="1076129" cy="646331"/>
+          </a:xfrm>
+          <a:prstGeom prst="rect">
+            <a:avLst/>
+          </a:prstGeom>
+          <a:noFill/>
+        </p:spPr>
+        <p:txBody>
+          <a:bodyPr wrap="square" rtlCol="0">
+            <a:spAutoFit/>
+          </a:bodyPr>
+          <a:lstStyle/>
+          <a:p>
+            <a:r>
+              <a:rPr lang="en-IN" dirty="0" smtClean="0">
+                <a:solidFill>
+                  <a:schemeClr val="bg1"/>
+                </a:solidFill>
+              </a:rPr>
+              <a:t>10 Runs</a:t>
+            </a:r>
+            <a:endParaRPr lang="en-IN" dirty="0">
+              <a:solidFill>
+                <a:schemeClr val="bg1"/>
+              </a:solidFill>
+            </a:endParaRPr>
+          </a:p>
+          <a:p>
+            <a:r>
+              <a:rPr lang="en-IN" dirty="0">
+                <a:solidFill>
+                  <a:schemeClr val="bg1"/>
+                </a:solidFill>
+              </a:rPr>
+              <a:t>1 </a:t>
+            </a:r>
+            <a:r>
+              <a:rPr lang="en-IN" dirty="0" smtClean="0">
+                <a:solidFill>
+                  <a:schemeClr val="bg1"/>
+                </a:solidFill>
+              </a:rPr>
+              <a:t>Balls</a:t>
+            </a:r>
+            <a:endParaRPr lang="en-IN" dirty="0">
+              <a:solidFill>
+                <a:schemeClr val="bg1"/>
+              </a:solidFill>
+            </a:endParaRPr>
+          </a:p>
+        </p:txBody>
+      </p:sp>
     </p:spTree>
     <p:extLst>
       <p:ext uri="{BB962C8B-B14F-4D97-AF65-F5344CB8AC3E}">
-        <p14:creationId xmlns:p14="http://schemas.microsoft.com/office/powerpoint/2010/main" val="3015747920"/>
+        <p14:creationId xmlns:p14="http://schemas.microsoft.com/office/powerpoint/2010/main" val="1770688664"/>
+      </p:ext>
+    </p:extLst>
+  </p:cSld>
+  <p:clrMapOvr>
+    <a:masterClrMapping/>
+  </p:clrMapOvr>
+</p:sld>
+</file>
+
+<file path=ppt/slides/slide6.xml><?xml version="1.0" encoding="utf-8"?>
+<p:sld xmlns:a="http://schemas.openxmlformats.org/drawingml/2006/main" xmlns:r="http://schemas.openxmlformats.org/officeDocument/2006/relationships" xmlns:p="http://schemas.openxmlformats.org/presentationml/2006/main">
+  <p:cSld>
+    <p:spTree>
+      <p:nvGrpSpPr>
+        <p:cNvPr id="1" name=""/>
+        <p:cNvGrpSpPr/>
+        <p:nvPr/>
+      </p:nvGrpSpPr>
+      <p:grpSpPr>
+        <a:xfrm>
+          <a:off x="0" y="0"/>
+          <a:ext cx="0" cy="0"/>
+          <a:chOff x="0" y="0"/>
+          <a:chExt cx="0" cy="0"/>
+        </a:xfrm>
+      </p:grpSpPr>
+      <p:sp>
+        <p:nvSpPr>
+          <p:cNvPr id="2" name="Title 1"/>
+          <p:cNvSpPr>
+            <a:spLocks noGrp="1"/>
+          </p:cNvSpPr>
+          <p:nvPr>
+            <p:ph type="title"/>
+          </p:nvPr>
+        </p:nvSpPr>
+        <p:spPr/>
+        <p:txBody>
+          <a:bodyPr>
+            <a:noAutofit/>
+          </a:bodyPr>
+          <a:lstStyle/>
+          <a:p>
+            <a:pPr algn="ctr"/>
+            <a:r>
+              <a:rPr lang="en-US" sz="7200" dirty="0" smtClean="0"/>
+              <a:t>Approach 1</a:t>
+            </a:r>
+            <a:br>
+              <a:rPr lang="en-US" sz="7200" dirty="0" smtClean="0"/>
+            </a:br>
+            <a:r>
+              <a:rPr lang="en-US" sz="7200" dirty="0" smtClean="0"/>
+              <a:t>Recursion</a:t>
+            </a:r>
+            <a:endParaRPr lang="en-US" sz="7200" dirty="0"/>
+          </a:p>
+        </p:txBody>
+      </p:sp>
+      <p:sp>
+        <p:nvSpPr>
+          <p:cNvPr id="3" name="TextBox 2"/>
+          <p:cNvSpPr txBox="1"/>
+          <p:nvPr/>
+        </p:nvSpPr>
+        <p:spPr>
+          <a:xfrm>
+            <a:off x="1287887" y="3657600"/>
+            <a:ext cx="8371268" cy="1384995"/>
+          </a:xfrm>
+          <a:prstGeom prst="rect">
+            <a:avLst/>
+          </a:prstGeom>
+          <a:noFill/>
+        </p:spPr>
+        <p:txBody>
+          <a:bodyPr wrap="square" rtlCol="0">
+            <a:spAutoFit/>
+          </a:bodyPr>
+          <a:lstStyle/>
+          <a:p>
+            <a:r>
+              <a:rPr lang="en-US" sz="2800" b="1" dirty="0"/>
+              <a:t>Time Complexity: </a:t>
+            </a:r>
+            <a:r>
+              <a:rPr lang="en-US" sz="2800" dirty="0"/>
+              <a:t>O(2</a:t>
+            </a:r>
+            <a:r>
+              <a:rPr lang="en-US" sz="2800" baseline="30000" dirty="0"/>
+              <a:t>N</a:t>
+            </a:r>
+            <a:r>
+              <a:rPr lang="en-US" sz="2800" dirty="0"/>
+              <a:t>)</a:t>
+            </a:r>
+            <a:r>
+              <a:rPr lang="en-US" sz="2800" dirty="0"/>
+              <a:t/>
+            </a:r>
+            <a:br>
+              <a:rPr lang="en-US" sz="2800" dirty="0"/>
+            </a:br>
+            <a:r>
+              <a:rPr lang="en-US" sz="2800" b="1" dirty="0"/>
+              <a:t>Auxiliary Space: </a:t>
+            </a:r>
+            <a:r>
+              <a:rPr lang="en-US" sz="2800" dirty="0"/>
+              <a:t>O(N), Stack space required for recursion</a:t>
+            </a:r>
+            <a:endParaRPr lang="en-US" sz="2800" dirty="0"/>
+          </a:p>
+        </p:txBody>
+      </p:sp>
+    </p:spTree>
+    <p:extLst>
+      <p:ext uri="{BB962C8B-B14F-4D97-AF65-F5344CB8AC3E}">
+        <p14:creationId xmlns:p14="http://schemas.microsoft.com/office/powerpoint/2010/main" val="2662917522"/>
+      </p:ext>
+    </p:extLst>
+  </p:cSld>
+  <p:clrMapOvr>
+    <a:masterClrMapping/>
+  </p:clrMapOvr>
+</p:sld>
+</file>
+
+<file path=ppt/slides/slide7.xml><?xml version="1.0" encoding="utf-8"?>
+<p:sld xmlns:a="http://schemas.openxmlformats.org/drawingml/2006/main" xmlns:r="http://schemas.openxmlformats.org/officeDocument/2006/relationships" xmlns:p="http://schemas.openxmlformats.org/presentationml/2006/main">
+  <p:cSld>
+    <p:spTree>
+      <p:nvGrpSpPr>
+        <p:cNvPr id="1" name=""/>
+        <p:cNvGrpSpPr/>
+        <p:nvPr/>
+      </p:nvGrpSpPr>
+      <p:grpSpPr>
+        <a:xfrm>
+          <a:off x="0" y="0"/>
+          <a:ext cx="0" cy="0"/>
+          <a:chOff x="0" y="0"/>
+          <a:chExt cx="0" cy="0"/>
+        </a:xfrm>
+      </p:grpSpPr>
+      <p:sp>
+        <p:nvSpPr>
+          <p:cNvPr id="2" name="Title 1"/>
+          <p:cNvSpPr>
+            <a:spLocks noGrp="1"/>
+          </p:cNvSpPr>
+          <p:nvPr>
+            <p:ph type="title"/>
+          </p:nvPr>
+        </p:nvSpPr>
+        <p:spPr/>
+        <p:txBody>
+          <a:bodyPr>
+            <a:noAutofit/>
+          </a:bodyPr>
+          <a:lstStyle/>
+          <a:p>
+            <a:pPr algn="ctr"/>
+            <a:r>
+              <a:rPr lang="en-US" sz="8000" dirty="0" smtClean="0"/>
+              <a:t>Approach 2 Dynamic Programming</a:t>
+            </a:r>
+            <a:endParaRPr lang="en-US" sz="8000" dirty="0"/>
+          </a:p>
+        </p:txBody>
+      </p:sp>
+    </p:spTree>
+    <p:extLst>
+      <p:ext uri="{BB962C8B-B14F-4D97-AF65-F5344CB8AC3E}">
+        <p14:creationId xmlns:p14="http://schemas.microsoft.com/office/powerpoint/2010/main" val="463893751"/>
+      </p:ext>
+    </p:extLst>
+  </p:cSld>
+  <p:clrMapOvr>
+    <a:masterClrMapping/>
+  </p:clrMapOvr>
+</p:sld>
+</file>
+
+<file path=ppt/slides/slide8.xml><?xml version="1.0" encoding="utf-8"?>
+<p:sld xmlns:a="http://schemas.openxmlformats.org/drawingml/2006/main" xmlns:r="http://schemas.openxmlformats.org/officeDocument/2006/relationships" xmlns:p="http://schemas.openxmlformats.org/presentationml/2006/main">
+  <p:cSld>
+    <p:spTree>
+      <p:nvGrpSpPr>
+        <p:cNvPr id="1" name=""/>
+        <p:cNvGrpSpPr/>
+        <p:nvPr/>
+      </p:nvGrpSpPr>
+      <p:grpSpPr>
+        <a:xfrm>
+          <a:off x="0" y="0"/>
+          <a:ext cx="0" cy="0"/>
+          <a:chOff x="0" y="0"/>
+          <a:chExt cx="0" cy="0"/>
+        </a:xfrm>
+      </p:grpSpPr>
+      <p:sp>
+        <p:nvSpPr>
+          <p:cNvPr id="2" name="Title 1"/>
+          <p:cNvSpPr>
+            <a:spLocks noGrp="1"/>
+          </p:cNvSpPr>
+          <p:nvPr>
+            <p:ph type="title"/>
+          </p:nvPr>
+        </p:nvSpPr>
+        <p:spPr/>
+        <p:txBody>
+          <a:bodyPr/>
+          <a:lstStyle/>
+          <a:p>
+            <a:r>
+              <a:rPr lang="en-US" dirty="0" smtClean="0"/>
+              <a:t>15+0 v/s 0 </a:t>
+            </a:r>
+            <a:endParaRPr lang="en-US" dirty="0"/>
+          </a:p>
+        </p:txBody>
+      </p:sp>
+      <p:graphicFrame>
+        <p:nvGraphicFramePr>
+          <p:cNvPr id="3" name="Table 2"/>
+          <p:cNvGraphicFramePr>
+            <a:graphicFrameLocks noGrp="1"/>
+          </p:cNvGraphicFramePr>
+          <p:nvPr>
+            <p:extLst>
+              <p:ext uri="{D42A27DB-BD31-4B8C-83A1-F6EECF244321}">
+                <p14:modId xmlns:p14="http://schemas.microsoft.com/office/powerpoint/2010/main" val="3767077496"/>
+              </p:ext>
+            </p:extLst>
+          </p:nvPr>
+        </p:nvGraphicFramePr>
+        <p:xfrm>
+          <a:off x="872901" y="2612860"/>
+          <a:ext cx="8567313" cy="2595880"/>
+        </p:xfrm>
+        <a:graphic>
+          <a:graphicData uri="http://schemas.openxmlformats.org/drawingml/2006/table">
+            <a:tbl>
+              <a:tblPr firstRow="1" bandRow="1">
+                <a:tableStyleId>{5C22544A-7EE6-4342-B048-85BDC9FD1C3A}</a:tableStyleId>
+              </a:tblPr>
+              <a:tblGrid>
+                <a:gridCol w="1483933"/>
+                <a:gridCol w="991673"/>
+                <a:gridCol w="759854"/>
+                <a:gridCol w="785611"/>
+                <a:gridCol w="927279"/>
+                <a:gridCol w="837126"/>
+                <a:gridCol w="875764"/>
+                <a:gridCol w="940158"/>
+                <a:gridCol w="965915"/>
+              </a:tblGrid>
+              <a:tr h="370840">
+                <a:tc>
+                  <a:txBody>
+                    <a:bodyPr/>
+                    <a:lstStyle/>
+                    <a:p>
+                      <a:r>
+                        <a:rPr lang="en-US" dirty="0" smtClean="0"/>
+                        <a:t>Runs-Balls</a:t>
+                      </a:r>
+                      <a:endParaRPr lang="en-US" dirty="0"/>
+                    </a:p>
+                  </a:txBody>
+                  <a:tcPr/>
+                </a:tc>
+                <a:tc>
+                  <a:txBody>
+                    <a:bodyPr/>
+                    <a:lstStyle/>
+                    <a:p>
+                      <a:r>
+                        <a:rPr lang="en-US" dirty="0" smtClean="0"/>
+                        <a:t>0</a:t>
+                      </a:r>
+                      <a:endParaRPr lang="en-US" dirty="0"/>
+                    </a:p>
+                  </a:txBody>
+                  <a:tcPr/>
+                </a:tc>
+                <a:tc>
+                  <a:txBody>
+                    <a:bodyPr/>
+                    <a:lstStyle/>
+                    <a:p>
+                      <a:r>
+                        <a:rPr lang="en-US" dirty="0" smtClean="0"/>
+                        <a:t>1</a:t>
+                      </a:r>
+                      <a:endParaRPr lang="en-US" dirty="0"/>
+                    </a:p>
+                  </a:txBody>
+                  <a:tcPr/>
+                </a:tc>
+                <a:tc>
+                  <a:txBody>
+                    <a:bodyPr/>
+                    <a:lstStyle/>
+                    <a:p>
+                      <a:r>
+                        <a:rPr lang="en-US" dirty="0" smtClean="0"/>
+                        <a:t>2</a:t>
+                      </a:r>
+                      <a:endParaRPr lang="en-US" dirty="0"/>
+                    </a:p>
+                  </a:txBody>
+                  <a:tcPr/>
+                </a:tc>
+                <a:tc>
+                  <a:txBody>
+                    <a:bodyPr/>
+                    <a:lstStyle/>
+                    <a:p>
+                      <a:r>
+                        <a:rPr lang="en-US" dirty="0" smtClean="0"/>
+                        <a:t>3</a:t>
+                      </a:r>
+                      <a:endParaRPr lang="en-US" dirty="0"/>
+                    </a:p>
+                  </a:txBody>
+                  <a:tcPr/>
+                </a:tc>
+                <a:tc>
+                  <a:txBody>
+                    <a:bodyPr/>
+                    <a:lstStyle/>
+                    <a:p>
+                      <a:r>
+                        <a:rPr lang="en-US" dirty="0" smtClean="0"/>
+                        <a:t>4</a:t>
+                      </a:r>
+                      <a:endParaRPr lang="en-US" dirty="0"/>
+                    </a:p>
+                  </a:txBody>
+                  <a:tcPr/>
+                </a:tc>
+                <a:tc>
+                  <a:txBody>
+                    <a:bodyPr/>
+                    <a:lstStyle/>
+                    <a:p>
+                      <a:r>
+                        <a:rPr lang="en-US" dirty="0" smtClean="0"/>
+                        <a:t>5</a:t>
+                      </a:r>
+                      <a:endParaRPr lang="en-US" dirty="0"/>
+                    </a:p>
+                  </a:txBody>
+                  <a:tcPr/>
+                </a:tc>
+                <a:tc>
+                  <a:txBody>
+                    <a:bodyPr/>
+                    <a:lstStyle/>
+                    <a:p>
+                      <a:r>
+                        <a:rPr lang="en-US" dirty="0" smtClean="0"/>
+                        <a:t>6</a:t>
+                      </a:r>
+                      <a:endParaRPr lang="en-US" dirty="0"/>
+                    </a:p>
+                  </a:txBody>
+                  <a:tcPr/>
+                </a:tc>
+                <a:tc>
+                  <a:txBody>
+                    <a:bodyPr/>
+                    <a:lstStyle/>
+                    <a:p>
+                      <a:r>
+                        <a:rPr lang="en-US" dirty="0" smtClean="0"/>
+                        <a:t>7</a:t>
+                      </a:r>
+                      <a:endParaRPr lang="en-US" dirty="0"/>
+                    </a:p>
+                  </a:txBody>
+                  <a:tcPr/>
+                </a:tc>
+              </a:tr>
+              <a:tr h="370840">
+                <a:tc>
+                  <a:txBody>
+                    <a:bodyPr/>
+                    <a:lstStyle/>
+                    <a:p>
+                      <a:r>
+                        <a:rPr lang="en-US" dirty="0" smtClean="0"/>
+                        <a:t>-</a:t>
+                      </a:r>
+                      <a:endParaRPr lang="en-US" dirty="0"/>
+                    </a:p>
+                  </a:txBody>
+                  <a:tcPr/>
+                </a:tc>
+                <a:tc>
+                  <a:txBody>
+                    <a:bodyPr/>
+                    <a:lstStyle/>
+                    <a:p>
+                      <a:r>
+                        <a:rPr lang="en-US" dirty="0" smtClean="0"/>
+                        <a:t>0</a:t>
+                      </a:r>
+                      <a:endParaRPr lang="en-US" dirty="0"/>
+                    </a:p>
+                  </a:txBody>
+                  <a:tcPr/>
+                </a:tc>
+                <a:tc>
+                  <a:txBody>
+                    <a:bodyPr/>
+                    <a:lstStyle/>
+                    <a:p>
+                      <a:r>
+                        <a:rPr lang="en-US" dirty="0" smtClean="0"/>
+                        <a:t>0</a:t>
+                      </a:r>
+                      <a:endParaRPr lang="en-US" dirty="0"/>
+                    </a:p>
+                  </a:txBody>
+                  <a:tcPr/>
+                </a:tc>
+                <a:tc>
+                  <a:txBody>
+                    <a:bodyPr/>
+                    <a:lstStyle/>
+                    <a:p>
+                      <a:r>
+                        <a:rPr lang="en-US" dirty="0" smtClean="0"/>
+                        <a:t>0</a:t>
+                      </a:r>
+                      <a:endParaRPr lang="en-US" dirty="0"/>
+                    </a:p>
+                  </a:txBody>
+                  <a:tcPr/>
+                </a:tc>
+                <a:tc>
+                  <a:txBody>
+                    <a:bodyPr/>
+                    <a:lstStyle/>
+                    <a:p>
+                      <a:r>
+                        <a:rPr lang="en-US" dirty="0" smtClean="0"/>
+                        <a:t>0</a:t>
+                      </a:r>
+                      <a:endParaRPr lang="en-US" dirty="0"/>
+                    </a:p>
+                  </a:txBody>
+                  <a:tcPr/>
+                </a:tc>
+                <a:tc>
+                  <a:txBody>
+                    <a:bodyPr/>
+                    <a:lstStyle/>
+                    <a:p>
+                      <a:r>
+                        <a:rPr lang="en-US" dirty="0" smtClean="0"/>
+                        <a:t>0</a:t>
+                      </a:r>
+                      <a:endParaRPr lang="en-US" dirty="0"/>
+                    </a:p>
+                  </a:txBody>
+                  <a:tcPr/>
+                </a:tc>
+                <a:tc>
+                  <a:txBody>
+                    <a:bodyPr/>
+                    <a:lstStyle/>
+                    <a:p>
+                      <a:r>
+                        <a:rPr lang="en-US" dirty="0" smtClean="0"/>
+                        <a:t>0</a:t>
+                      </a:r>
+                      <a:endParaRPr lang="en-US" dirty="0"/>
+                    </a:p>
+                  </a:txBody>
+                  <a:tcPr/>
+                </a:tc>
+                <a:tc>
+                  <a:txBody>
+                    <a:bodyPr/>
+                    <a:lstStyle/>
+                    <a:p>
+                      <a:r>
+                        <a:rPr lang="en-US" dirty="0" smtClean="0"/>
+                        <a:t>0</a:t>
+                      </a:r>
+                      <a:endParaRPr lang="en-US" dirty="0"/>
+                    </a:p>
+                  </a:txBody>
+                  <a:tcPr/>
+                </a:tc>
+                <a:tc>
+                  <a:txBody>
+                    <a:bodyPr/>
+                    <a:lstStyle/>
+                    <a:p>
+                      <a:r>
+                        <a:rPr lang="en-US" dirty="0" smtClean="0"/>
+                        <a:t>0</a:t>
+                      </a:r>
+                      <a:endParaRPr lang="en-US" dirty="0"/>
+                    </a:p>
+                  </a:txBody>
+                  <a:tcPr/>
+                </a:tc>
+              </a:tr>
+              <a:tr h="370840">
+                <a:tc>
+                  <a:txBody>
+                    <a:bodyPr/>
+                    <a:lstStyle/>
+                    <a:p>
+                      <a:r>
+                        <a:rPr lang="en-US" dirty="0" smtClean="0"/>
+                        <a:t>15-2</a:t>
+                      </a:r>
+                      <a:endParaRPr lang="en-US" dirty="0"/>
+                    </a:p>
+                  </a:txBody>
+                  <a:tcPr/>
+                </a:tc>
+                <a:tc>
+                  <a:txBody>
+                    <a:bodyPr/>
+                    <a:lstStyle/>
+                    <a:p>
+                      <a:r>
+                        <a:rPr lang="en-US" dirty="0" smtClean="0"/>
+                        <a:t>0</a:t>
+                      </a:r>
+                      <a:endParaRPr lang="en-US" dirty="0"/>
+                    </a:p>
+                  </a:txBody>
+                  <a:tcPr/>
+                </a:tc>
+                <a:tc>
+                  <a:txBody>
+                    <a:bodyPr/>
+                    <a:lstStyle/>
+                    <a:p>
+                      <a:endParaRPr lang="en-US" dirty="0"/>
+                    </a:p>
+                  </a:txBody>
+                  <a:tcPr/>
+                </a:tc>
+                <a:tc>
+                  <a:txBody>
+                    <a:bodyPr/>
+                    <a:lstStyle/>
+                    <a:p>
+                      <a:endParaRPr lang="en-US" dirty="0"/>
+                    </a:p>
+                  </a:txBody>
+                  <a:tcPr/>
+                </a:tc>
+                <a:tc>
+                  <a:txBody>
+                    <a:bodyPr/>
+                    <a:lstStyle/>
+                    <a:p>
+                      <a:endParaRPr lang="en-US" dirty="0"/>
+                    </a:p>
+                  </a:txBody>
+                  <a:tcPr/>
+                </a:tc>
+                <a:tc>
+                  <a:txBody>
+                    <a:bodyPr/>
+                    <a:lstStyle/>
+                    <a:p>
+                      <a:endParaRPr lang="en-US" dirty="0"/>
+                    </a:p>
+                  </a:txBody>
+                  <a:tcPr/>
+                </a:tc>
+                <a:tc>
+                  <a:txBody>
+                    <a:bodyPr/>
+                    <a:lstStyle/>
+                    <a:p>
+                      <a:endParaRPr lang="en-US" dirty="0"/>
+                    </a:p>
+                  </a:txBody>
+                  <a:tcPr/>
+                </a:tc>
+                <a:tc>
+                  <a:txBody>
+                    <a:bodyPr/>
+                    <a:lstStyle/>
+                    <a:p>
+                      <a:endParaRPr lang="en-US"/>
+                    </a:p>
+                  </a:txBody>
+                  <a:tcPr/>
+                </a:tc>
+                <a:tc>
+                  <a:txBody>
+                    <a:bodyPr/>
+                    <a:lstStyle/>
+                    <a:p>
+                      <a:endParaRPr lang="en-US"/>
+                    </a:p>
+                  </a:txBody>
+                  <a:tcPr/>
+                </a:tc>
+              </a:tr>
+              <a:tr h="370840">
+                <a:tc>
+                  <a:txBody>
+                    <a:bodyPr/>
+                    <a:lstStyle/>
+                    <a:p>
+                      <a:r>
+                        <a:rPr lang="en-US" dirty="0" smtClean="0"/>
+                        <a:t>14-5</a:t>
+                      </a:r>
+                      <a:endParaRPr lang="en-US" dirty="0"/>
+                    </a:p>
+                  </a:txBody>
+                  <a:tcPr/>
+                </a:tc>
+                <a:tc>
+                  <a:txBody>
+                    <a:bodyPr/>
+                    <a:lstStyle/>
+                    <a:p>
+                      <a:r>
+                        <a:rPr lang="en-US" dirty="0" smtClean="0"/>
+                        <a:t>0</a:t>
+                      </a:r>
+                      <a:endParaRPr lang="en-US" dirty="0"/>
+                    </a:p>
+                  </a:txBody>
+                  <a:tcPr/>
+                </a:tc>
+                <a:tc>
+                  <a:txBody>
+                    <a:bodyPr/>
+                    <a:lstStyle/>
+                    <a:p>
+                      <a:endParaRPr lang="en-US"/>
+                    </a:p>
+                  </a:txBody>
+                  <a:tcPr/>
+                </a:tc>
+                <a:tc>
+                  <a:txBody>
+                    <a:bodyPr/>
+                    <a:lstStyle/>
+                    <a:p>
+                      <a:endParaRPr lang="en-US"/>
+                    </a:p>
+                  </a:txBody>
+                  <a:tcPr/>
+                </a:tc>
+                <a:tc>
+                  <a:txBody>
+                    <a:bodyPr/>
+                    <a:lstStyle/>
+                    <a:p>
+                      <a:endParaRPr lang="en-US"/>
+                    </a:p>
+                  </a:txBody>
+                  <a:tcPr/>
+                </a:tc>
+                <a:tc>
+                  <a:txBody>
+                    <a:bodyPr/>
+                    <a:lstStyle/>
+                    <a:p>
+                      <a:endParaRPr lang="en-US"/>
+                    </a:p>
+                  </a:txBody>
+                  <a:tcPr/>
+                </a:tc>
+                <a:tc>
+                  <a:txBody>
+                    <a:bodyPr/>
+                    <a:lstStyle/>
+                    <a:p>
+                      <a:endParaRPr lang="en-US"/>
+                    </a:p>
+                  </a:txBody>
+                  <a:tcPr/>
+                </a:tc>
+                <a:tc>
+                  <a:txBody>
+                    <a:bodyPr/>
+                    <a:lstStyle/>
+                    <a:p>
+                      <a:endParaRPr lang="en-US"/>
+                    </a:p>
+                  </a:txBody>
+                  <a:tcPr/>
+                </a:tc>
+                <a:tc>
+                  <a:txBody>
+                    <a:bodyPr/>
+                    <a:lstStyle/>
+                    <a:p>
+                      <a:endParaRPr lang="en-US"/>
+                    </a:p>
+                  </a:txBody>
+                  <a:tcPr/>
+                </a:tc>
+              </a:tr>
+              <a:tr h="370840">
+                <a:tc>
+                  <a:txBody>
+                    <a:bodyPr/>
+                    <a:lstStyle/>
+                    <a:p>
+                      <a:r>
+                        <a:rPr lang="en-US" dirty="0" smtClean="0"/>
+                        <a:t>10-2</a:t>
+                      </a:r>
+                      <a:endParaRPr lang="en-US" dirty="0"/>
+                    </a:p>
+                  </a:txBody>
+                  <a:tcPr/>
+                </a:tc>
+                <a:tc>
+                  <a:txBody>
+                    <a:bodyPr/>
+                    <a:lstStyle/>
+                    <a:p>
+                      <a:r>
+                        <a:rPr lang="en-US" dirty="0" smtClean="0"/>
+                        <a:t>0</a:t>
+                      </a:r>
+                      <a:endParaRPr lang="en-US" dirty="0"/>
+                    </a:p>
+                  </a:txBody>
+                  <a:tcPr/>
+                </a:tc>
+                <a:tc>
+                  <a:txBody>
+                    <a:bodyPr/>
+                    <a:lstStyle/>
+                    <a:p>
+                      <a:endParaRPr lang="en-US"/>
+                    </a:p>
+                  </a:txBody>
+                  <a:tcPr/>
+                </a:tc>
+                <a:tc>
+                  <a:txBody>
+                    <a:bodyPr/>
+                    <a:lstStyle/>
+                    <a:p>
+                      <a:endParaRPr lang="en-US"/>
+                    </a:p>
+                  </a:txBody>
+                  <a:tcPr/>
+                </a:tc>
+                <a:tc>
+                  <a:txBody>
+                    <a:bodyPr/>
+                    <a:lstStyle/>
+                    <a:p>
+                      <a:endParaRPr lang="en-US"/>
+                    </a:p>
+                  </a:txBody>
+                  <a:tcPr/>
+                </a:tc>
+                <a:tc>
+                  <a:txBody>
+                    <a:bodyPr/>
+                    <a:lstStyle/>
+                    <a:p>
+                      <a:endParaRPr lang="en-US"/>
+                    </a:p>
+                  </a:txBody>
+                  <a:tcPr/>
+                </a:tc>
+                <a:tc>
+                  <a:txBody>
+                    <a:bodyPr/>
+                    <a:lstStyle/>
+                    <a:p>
+                      <a:endParaRPr lang="en-US"/>
+                    </a:p>
+                  </a:txBody>
+                  <a:tcPr/>
+                </a:tc>
+                <a:tc>
+                  <a:txBody>
+                    <a:bodyPr/>
+                    <a:lstStyle/>
+                    <a:p>
+                      <a:endParaRPr lang="en-US"/>
+                    </a:p>
+                  </a:txBody>
+                  <a:tcPr/>
+                </a:tc>
+                <a:tc>
+                  <a:txBody>
+                    <a:bodyPr/>
+                    <a:lstStyle/>
+                    <a:p>
+                      <a:endParaRPr lang="en-US"/>
+                    </a:p>
+                  </a:txBody>
+                  <a:tcPr/>
+                </a:tc>
+              </a:tr>
+              <a:tr h="370840">
+                <a:tc>
+                  <a:txBody>
+                    <a:bodyPr/>
+                    <a:lstStyle/>
+                    <a:p>
+                      <a:r>
+                        <a:rPr lang="en-US" dirty="0" smtClean="0"/>
+                        <a:t>45-3</a:t>
+                      </a:r>
+                      <a:endParaRPr lang="en-US" dirty="0"/>
+                    </a:p>
+                  </a:txBody>
+                  <a:tcPr/>
+                </a:tc>
+                <a:tc>
+                  <a:txBody>
+                    <a:bodyPr/>
+                    <a:lstStyle/>
+                    <a:p>
+                      <a:r>
+                        <a:rPr lang="en-US" dirty="0" smtClean="0"/>
+                        <a:t>0</a:t>
+                      </a:r>
+                      <a:endParaRPr lang="en-US" dirty="0"/>
+                    </a:p>
+                  </a:txBody>
+                  <a:tcPr/>
+                </a:tc>
+                <a:tc>
+                  <a:txBody>
+                    <a:bodyPr/>
+                    <a:lstStyle/>
+                    <a:p>
+                      <a:endParaRPr lang="en-US"/>
+                    </a:p>
+                  </a:txBody>
+                  <a:tcPr/>
+                </a:tc>
+                <a:tc>
+                  <a:txBody>
+                    <a:bodyPr/>
+                    <a:lstStyle/>
+                    <a:p>
+                      <a:endParaRPr lang="en-US"/>
+                    </a:p>
+                  </a:txBody>
+                  <a:tcPr/>
+                </a:tc>
+                <a:tc>
+                  <a:txBody>
+                    <a:bodyPr/>
+                    <a:lstStyle/>
+                    <a:p>
+                      <a:endParaRPr lang="en-US"/>
+                    </a:p>
+                  </a:txBody>
+                  <a:tcPr/>
+                </a:tc>
+                <a:tc>
+                  <a:txBody>
+                    <a:bodyPr/>
+                    <a:lstStyle/>
+                    <a:p>
+                      <a:endParaRPr lang="en-US"/>
+                    </a:p>
+                  </a:txBody>
+                  <a:tcPr/>
+                </a:tc>
+                <a:tc>
+                  <a:txBody>
+                    <a:bodyPr/>
+                    <a:lstStyle/>
+                    <a:p>
+                      <a:endParaRPr lang="en-US"/>
+                    </a:p>
+                  </a:txBody>
+                  <a:tcPr/>
+                </a:tc>
+                <a:tc>
+                  <a:txBody>
+                    <a:bodyPr/>
+                    <a:lstStyle/>
+                    <a:p>
+                      <a:endParaRPr lang="en-US"/>
+                    </a:p>
+                  </a:txBody>
+                  <a:tcPr/>
+                </a:tc>
+                <a:tc>
+                  <a:txBody>
+                    <a:bodyPr/>
+                    <a:lstStyle/>
+                    <a:p>
+                      <a:endParaRPr lang="en-US"/>
+                    </a:p>
+                  </a:txBody>
+                  <a:tcPr/>
+                </a:tc>
+              </a:tr>
+              <a:tr h="370840">
+                <a:tc>
+                  <a:txBody>
+                    <a:bodyPr/>
+                    <a:lstStyle/>
+                    <a:p>
+                      <a:r>
+                        <a:rPr lang="en-US" dirty="0" smtClean="0"/>
+                        <a:t>30-4</a:t>
+                      </a:r>
+                      <a:endParaRPr lang="en-US" dirty="0"/>
+                    </a:p>
+                  </a:txBody>
+                  <a:tcPr/>
+                </a:tc>
+                <a:tc>
+                  <a:txBody>
+                    <a:bodyPr/>
+                    <a:lstStyle/>
+                    <a:p>
+                      <a:r>
+                        <a:rPr lang="en-US" dirty="0" smtClean="0"/>
+                        <a:t>0</a:t>
+                      </a:r>
+                      <a:endParaRPr lang="en-US" dirty="0"/>
+                    </a:p>
+                  </a:txBody>
+                  <a:tcPr/>
+                </a:tc>
+                <a:tc>
+                  <a:txBody>
+                    <a:bodyPr/>
+                    <a:lstStyle/>
+                    <a:p>
+                      <a:endParaRPr lang="en-US"/>
+                    </a:p>
+                  </a:txBody>
+                  <a:tcPr/>
+                </a:tc>
+                <a:tc>
+                  <a:txBody>
+                    <a:bodyPr/>
+                    <a:lstStyle/>
+                    <a:p>
+                      <a:endParaRPr lang="en-US"/>
+                    </a:p>
+                  </a:txBody>
+                  <a:tcPr/>
+                </a:tc>
+                <a:tc>
+                  <a:txBody>
+                    <a:bodyPr/>
+                    <a:lstStyle/>
+                    <a:p>
+                      <a:endParaRPr lang="en-US"/>
+                    </a:p>
+                  </a:txBody>
+                  <a:tcPr/>
+                </a:tc>
+                <a:tc>
+                  <a:txBody>
+                    <a:bodyPr/>
+                    <a:lstStyle/>
+                    <a:p>
+                      <a:endParaRPr lang="en-US"/>
+                    </a:p>
+                  </a:txBody>
+                  <a:tcPr/>
+                </a:tc>
+                <a:tc>
+                  <a:txBody>
+                    <a:bodyPr/>
+                    <a:lstStyle/>
+                    <a:p>
+                      <a:endParaRPr lang="en-US"/>
+                    </a:p>
+                  </a:txBody>
+                  <a:tcPr/>
+                </a:tc>
+                <a:tc>
+                  <a:txBody>
+                    <a:bodyPr/>
+                    <a:lstStyle/>
+                    <a:p>
+                      <a:endParaRPr lang="en-US"/>
+                    </a:p>
+                  </a:txBody>
+                  <a:tcPr/>
+                </a:tc>
+                <a:tc>
+                  <a:txBody>
+                    <a:bodyPr/>
+                    <a:lstStyle/>
+                    <a:p>
+                      <a:endParaRPr lang="en-US" dirty="0"/>
+                    </a:p>
+                  </a:txBody>
+                  <a:tcPr/>
+                </a:tc>
+              </a:tr>
+            </a:tbl>
+          </a:graphicData>
+        </a:graphic>
+      </p:graphicFrame>
+      <p:sp>
+        <p:nvSpPr>
+          <p:cNvPr id="5" name="TextBox 4"/>
+          <p:cNvSpPr txBox="1"/>
+          <p:nvPr/>
+        </p:nvSpPr>
+        <p:spPr>
+          <a:xfrm>
+            <a:off x="1738649" y="2112135"/>
+            <a:ext cx="1622738" cy="369332"/>
+          </a:xfrm>
+          <a:prstGeom prst="rect">
+            <a:avLst/>
+          </a:prstGeom>
+          <a:noFill/>
+        </p:spPr>
+        <p:txBody>
+          <a:bodyPr wrap="square" rtlCol="0">
+            <a:spAutoFit/>
+          </a:bodyPr>
+          <a:lstStyle/>
+          <a:p>
+            <a:r>
+              <a:rPr lang="en-US" dirty="0" smtClean="0"/>
+              <a:t>Balls/Weights</a:t>
+            </a:r>
+            <a:endParaRPr lang="en-US" dirty="0"/>
+          </a:p>
+        </p:txBody>
+      </p:sp>
+      <p:sp>
+        <p:nvSpPr>
+          <p:cNvPr id="6" name="Right Arrow 5"/>
+          <p:cNvSpPr/>
+          <p:nvPr/>
+        </p:nvSpPr>
+        <p:spPr>
+          <a:xfrm>
+            <a:off x="3361387" y="2204468"/>
+            <a:ext cx="1803042" cy="184666"/>
+          </a:xfrm>
+          <a:prstGeom prst="rightArrow">
+            <a:avLst/>
+          </a:prstGeom>
+        </p:spPr>
+        <p:style>
+          <a:lnRef idx="2">
+            <a:schemeClr val="accent1">
+              <a:shade val="50000"/>
+            </a:schemeClr>
+          </a:lnRef>
+          <a:fillRef idx="1">
+            <a:schemeClr val="accent1"/>
+          </a:fillRef>
+          <a:effectRef idx="0">
+            <a:schemeClr val="accent1"/>
+          </a:effectRef>
+          <a:fontRef idx="minor">
+            <a:schemeClr val="lt1"/>
+          </a:fontRef>
+        </p:style>
+        <p:txBody>
+          <a:bodyPr rtlCol="0" anchor="ctr"/>
+          <a:lstStyle/>
+          <a:p>
+            <a:pPr algn="ctr"/>
+            <a:endParaRPr lang="en-US"/>
+          </a:p>
+        </p:txBody>
+      </p:sp>
+    </p:spTree>
+    <p:extLst>
+      <p:ext uri="{BB962C8B-B14F-4D97-AF65-F5344CB8AC3E}">
+        <p14:creationId xmlns:p14="http://schemas.microsoft.com/office/powerpoint/2010/main" val="20951974"/>
+      </p:ext>
+    </p:extLst>
+  </p:cSld>
+  <p:clrMapOvr>
+    <a:masterClrMapping/>
+  </p:clrMapOvr>
+</p:sld>
+</file>
+
+<file path=ppt/slides/slide9.xml><?xml version="1.0" encoding="utf-8"?>
+<p:sld xmlns:a="http://schemas.openxmlformats.org/drawingml/2006/main" xmlns:r="http://schemas.openxmlformats.org/officeDocument/2006/relationships" xmlns:p="http://schemas.openxmlformats.org/presentationml/2006/main">
+  <p:cSld>
+    <p:spTree>
+      <p:nvGrpSpPr>
+        <p:cNvPr id="1" name=""/>
+        <p:cNvGrpSpPr/>
+        <p:nvPr/>
+      </p:nvGrpSpPr>
+      <p:grpSpPr>
+        <a:xfrm>
+          <a:off x="0" y="0"/>
+          <a:ext cx="0" cy="0"/>
+          <a:chOff x="0" y="0"/>
+          <a:chExt cx="0" cy="0"/>
+        </a:xfrm>
+      </p:grpSpPr>
+      <p:sp>
+        <p:nvSpPr>
+          <p:cNvPr id="2" name="Title 1"/>
+          <p:cNvSpPr>
+            <a:spLocks noGrp="1"/>
+          </p:cNvSpPr>
+          <p:nvPr>
+            <p:ph type="title"/>
+          </p:nvPr>
+        </p:nvSpPr>
+        <p:spPr/>
+        <p:txBody>
+          <a:bodyPr>
+            <a:normAutofit/>
+          </a:bodyPr>
+          <a:lstStyle/>
+          <a:p>
+            <a:r>
+              <a:rPr lang="en-US" sz="4400" dirty="0" smtClean="0"/>
+              <a:t>Complexities</a:t>
+            </a:r>
+            <a:endParaRPr lang="en-US" sz="4400" dirty="0"/>
+          </a:p>
+        </p:txBody>
+      </p:sp>
+      <p:sp>
+        <p:nvSpPr>
+          <p:cNvPr id="3" name="Rectangle 2"/>
+          <p:cNvSpPr/>
+          <p:nvPr/>
+        </p:nvSpPr>
+        <p:spPr>
+          <a:xfrm>
+            <a:off x="910107" y="2497985"/>
+            <a:ext cx="6096000" cy="954107"/>
+          </a:xfrm>
+          <a:prstGeom prst="rect">
+            <a:avLst/>
+          </a:prstGeom>
+        </p:spPr>
+        <p:txBody>
+          <a:bodyPr>
+            <a:spAutoFit/>
+          </a:bodyPr>
+          <a:lstStyle/>
+          <a:p>
+            <a:r>
+              <a:rPr lang="en-US" sz="2800" b="1" dirty="0"/>
+              <a:t>Time Complexity: </a:t>
+            </a:r>
+            <a:r>
+              <a:rPr lang="en-US" sz="2800" dirty="0" smtClean="0"/>
+              <a:t>O(N*W)</a:t>
+            </a:r>
+            <a:r>
+              <a:rPr lang="en-US" sz="2800" dirty="0"/>
+              <a:t/>
+            </a:r>
+            <a:br>
+              <a:rPr lang="en-US" sz="2800" dirty="0"/>
+            </a:br>
+            <a:r>
+              <a:rPr lang="en-US" sz="2800" b="1" dirty="0"/>
+              <a:t>Auxiliary Space: </a:t>
+            </a:r>
+            <a:r>
+              <a:rPr lang="en-US" sz="2800" dirty="0" smtClean="0"/>
+              <a:t>O(N*W)</a:t>
+            </a:r>
+            <a:endParaRPr lang="en-US" sz="2800" dirty="0"/>
+          </a:p>
+        </p:txBody>
+      </p:sp>
+    </p:spTree>
+    <p:extLst>
+      <p:ext uri="{BB962C8B-B14F-4D97-AF65-F5344CB8AC3E}">
+        <p14:creationId xmlns:p14="http://schemas.microsoft.com/office/powerpoint/2010/main" val="1227997634"/>
       </p:ext>
     </p:extLst>
   </p:cSld>
@@ -7036,7 +9892,7 @@
     </a:clrScheme>
     <a:fontScheme name="Facet">
       <a:majorFont>
-        <a:latin typeface="Trebuchet MS" panose="020B0603020202020204"/>
+        <a:latin typeface="Trebuchet MS"/>
         <a:ea typeface=""/>
         <a:cs typeface=""/>
         <a:font script="Jpan" typeface="メイリオ"/>
@@ -7071,7 +9927,7 @@
         <a:font script="Geor" typeface="Sylfaen"/>
       </a:majorFont>
       <a:minorFont>
-        <a:latin typeface="Trebuchet MS" panose="020B0603020202020204"/>
+        <a:latin typeface="Trebuchet MS"/>
         <a:ea typeface=""/>
         <a:cs typeface=""/>
         <a:font script="Jpan" typeface="メイリオ"/>
@@ -7244,7 +10100,7 @@
   <a:extraClrSchemeLst/>
   <a:extLst>
     <a:ext uri="{05A4C25C-085E-4340-85A3-A5531E510DB2}">
-      <thm15:themeFamily xmlns:thm15="http://schemas.microsoft.com/office/thememl/2012/main" name="Facet" id="{C0C680CD-088A-49FC-A102-D699147F32B2}" vid="{CFBC31BA-B70F-4F30-BCAA-4F3011E16C4D}"/>
+      <thm15:themeFamily xmlns="" xmlns:thm15="http://schemas.microsoft.com/office/thememl/2012/main" name="Facet" id="{C0C680CD-088A-49FC-A102-D699147F32B2}" vid="{CFBC31BA-B70F-4F30-BCAA-4F3011E16C4D}"/>
     </a:ext>
   </a:extLst>
 </a:theme>

</xml_diff>